<commit_message>
Examen a casa version 28 Nov 2023
</commit_message>
<xml_diff>
--- a/Mod_Lineales_Examen_a_casa_v1_1.pptx
+++ b/Mod_Lineales_Examen_a_casa_v1_1.pptx
@@ -5,7 +5,7 @@
     <p:sldMasterId id="2147483660" r:id="rId1"/>
   </p:sldMasterIdLst>
   <p:notesMasterIdLst>
-    <p:notesMasterId r:id="rId17"/>
+    <p:notesMasterId r:id="rId20"/>
   </p:notesMasterIdLst>
   <p:sldIdLst>
     <p:sldId id="5873" r:id="rId2"/>
@@ -22,7 +22,10 @@
     <p:sldId id="5883" r:id="rId13"/>
     <p:sldId id="5890" r:id="rId14"/>
     <p:sldId id="5891" r:id="rId15"/>
-    <p:sldId id="5892" r:id="rId16"/>
+    <p:sldId id="5893" r:id="rId16"/>
+    <p:sldId id="5895" r:id="rId17"/>
+    <p:sldId id="5894" r:id="rId18"/>
+    <p:sldId id="5892" r:id="rId19"/>
   </p:sldIdLst>
   <p:sldSz cx="12192000" cy="6858000"/>
   <p:notesSz cx="6858000" cy="9144000"/>
@@ -124,7 +127,7 @@
   <p:extLst>
     <p:ext uri="{EFAFB233-063F-42B5-8137-9DF3F51BA10A}">
       <p15:sldGuideLst xmlns:p15="http://schemas.microsoft.com/office/powerpoint/2012/main">
-        <p15:guide id="1" orient="horz" pos="2136" userDrawn="1">
+        <p15:guide id="1" orient="horz" pos="2112" userDrawn="1">
           <p15:clr>
             <a:srgbClr val="A4A3A4"/>
           </p15:clr>
@@ -808,6 +811,258 @@
             <a:fld id="{ECECFD69-5CF0-4C25-BF49-DC0CB7221DAA}" type="slidenum">
               <a:rPr lang="es-MX" smtClean="0"/>
               <a:t>15</a:t>
+            </a:fld>
+            <a:endParaRPr lang="es-MX"/>
+          </a:p>
+        </p:txBody>
+      </p:sp>
+    </p:spTree>
+    <p:extLst>
+      <p:ext uri="{BB962C8B-B14F-4D97-AF65-F5344CB8AC3E}">
+        <p14:creationId xmlns:p14="http://schemas.microsoft.com/office/powerpoint/2010/main" val="1248528255"/>
+      </p:ext>
+    </p:extLst>
+  </p:cSld>
+  <p:clrMapOvr>
+    <a:masterClrMapping/>
+  </p:clrMapOvr>
+</p:notes>
+</file>
+
+<file path=ppt/notesSlides/notesSlide13.xml><?xml version="1.0" encoding="utf-8"?>
+<p:notes xmlns:a="http://schemas.openxmlformats.org/drawingml/2006/main" xmlns:r="http://schemas.openxmlformats.org/officeDocument/2006/relationships" xmlns:p="http://schemas.openxmlformats.org/presentationml/2006/main">
+  <p:cSld>
+    <p:spTree>
+      <p:nvGrpSpPr>
+        <p:cNvPr id="1" name=""/>
+        <p:cNvGrpSpPr/>
+        <p:nvPr/>
+      </p:nvGrpSpPr>
+      <p:grpSpPr>
+        <a:xfrm>
+          <a:off x="0" y="0"/>
+          <a:ext cx="0" cy="0"/>
+          <a:chOff x="0" y="0"/>
+          <a:chExt cx="0" cy="0"/>
+        </a:xfrm>
+      </p:grpSpPr>
+      <p:sp>
+        <p:nvSpPr>
+          <p:cNvPr id="2" name="Slide Image Placeholder 1"/>
+          <p:cNvSpPr>
+            <a:spLocks noGrp="1" noRot="1" noChangeAspect="1"/>
+          </p:cNvSpPr>
+          <p:nvPr>
+            <p:ph type="sldImg"/>
+          </p:nvPr>
+        </p:nvSpPr>
+        <p:spPr/>
+      </p:sp>
+      <p:sp>
+        <p:nvSpPr>
+          <p:cNvPr id="3" name="Notes Placeholder 2"/>
+          <p:cNvSpPr>
+            <a:spLocks noGrp="1"/>
+          </p:cNvSpPr>
+          <p:nvPr>
+            <p:ph type="body" idx="1"/>
+          </p:nvPr>
+        </p:nvSpPr>
+        <p:spPr/>
+        <p:txBody>
+          <a:bodyPr/>
+          <a:lstStyle/>
+          <a:p>
+            <a:endParaRPr lang="es-MX" dirty="0"/>
+          </a:p>
+        </p:txBody>
+      </p:sp>
+      <p:sp>
+        <p:nvSpPr>
+          <p:cNvPr id="4" name="Slide Number Placeholder 3"/>
+          <p:cNvSpPr>
+            <a:spLocks noGrp="1"/>
+          </p:cNvSpPr>
+          <p:nvPr>
+            <p:ph type="sldNum" sz="quarter" idx="5"/>
+          </p:nvPr>
+        </p:nvSpPr>
+        <p:spPr/>
+        <p:txBody>
+          <a:bodyPr/>
+          <a:lstStyle/>
+          <a:p>
+            <a:fld id="{ECECFD69-5CF0-4C25-BF49-DC0CB7221DAA}" type="slidenum">
+              <a:rPr lang="es-MX" smtClean="0"/>
+              <a:t>16</a:t>
+            </a:fld>
+            <a:endParaRPr lang="es-MX"/>
+          </a:p>
+        </p:txBody>
+      </p:sp>
+    </p:spTree>
+    <p:extLst>
+      <p:ext uri="{BB962C8B-B14F-4D97-AF65-F5344CB8AC3E}">
+        <p14:creationId xmlns:p14="http://schemas.microsoft.com/office/powerpoint/2010/main" val="96170148"/>
+      </p:ext>
+    </p:extLst>
+  </p:cSld>
+  <p:clrMapOvr>
+    <a:masterClrMapping/>
+  </p:clrMapOvr>
+</p:notes>
+</file>
+
+<file path=ppt/notesSlides/notesSlide14.xml><?xml version="1.0" encoding="utf-8"?>
+<p:notes xmlns:a="http://schemas.openxmlformats.org/drawingml/2006/main" xmlns:r="http://schemas.openxmlformats.org/officeDocument/2006/relationships" xmlns:p="http://schemas.openxmlformats.org/presentationml/2006/main">
+  <p:cSld>
+    <p:spTree>
+      <p:nvGrpSpPr>
+        <p:cNvPr id="1" name=""/>
+        <p:cNvGrpSpPr/>
+        <p:nvPr/>
+      </p:nvGrpSpPr>
+      <p:grpSpPr>
+        <a:xfrm>
+          <a:off x="0" y="0"/>
+          <a:ext cx="0" cy="0"/>
+          <a:chOff x="0" y="0"/>
+          <a:chExt cx="0" cy="0"/>
+        </a:xfrm>
+      </p:grpSpPr>
+      <p:sp>
+        <p:nvSpPr>
+          <p:cNvPr id="2" name="Slide Image Placeholder 1"/>
+          <p:cNvSpPr>
+            <a:spLocks noGrp="1" noRot="1" noChangeAspect="1"/>
+          </p:cNvSpPr>
+          <p:nvPr>
+            <p:ph type="sldImg"/>
+          </p:nvPr>
+        </p:nvSpPr>
+        <p:spPr/>
+      </p:sp>
+      <p:sp>
+        <p:nvSpPr>
+          <p:cNvPr id="3" name="Notes Placeholder 2"/>
+          <p:cNvSpPr>
+            <a:spLocks noGrp="1"/>
+          </p:cNvSpPr>
+          <p:nvPr>
+            <p:ph type="body" idx="1"/>
+          </p:nvPr>
+        </p:nvSpPr>
+        <p:spPr/>
+        <p:txBody>
+          <a:bodyPr/>
+          <a:lstStyle/>
+          <a:p>
+            <a:endParaRPr lang="es-MX" dirty="0"/>
+          </a:p>
+        </p:txBody>
+      </p:sp>
+      <p:sp>
+        <p:nvSpPr>
+          <p:cNvPr id="4" name="Slide Number Placeholder 3"/>
+          <p:cNvSpPr>
+            <a:spLocks noGrp="1"/>
+          </p:cNvSpPr>
+          <p:nvPr>
+            <p:ph type="sldNum" sz="quarter" idx="5"/>
+          </p:nvPr>
+        </p:nvSpPr>
+        <p:spPr/>
+        <p:txBody>
+          <a:bodyPr/>
+          <a:lstStyle/>
+          <a:p>
+            <a:fld id="{ECECFD69-5CF0-4C25-BF49-DC0CB7221DAA}" type="slidenum">
+              <a:rPr lang="es-MX" smtClean="0"/>
+              <a:t>17</a:t>
+            </a:fld>
+            <a:endParaRPr lang="es-MX"/>
+          </a:p>
+        </p:txBody>
+      </p:sp>
+    </p:spTree>
+    <p:extLst>
+      <p:ext uri="{BB962C8B-B14F-4D97-AF65-F5344CB8AC3E}">
+        <p14:creationId xmlns:p14="http://schemas.microsoft.com/office/powerpoint/2010/main" val="3932159511"/>
+      </p:ext>
+    </p:extLst>
+  </p:cSld>
+  <p:clrMapOvr>
+    <a:masterClrMapping/>
+  </p:clrMapOvr>
+</p:notes>
+</file>
+
+<file path=ppt/notesSlides/notesSlide15.xml><?xml version="1.0" encoding="utf-8"?>
+<p:notes xmlns:a="http://schemas.openxmlformats.org/drawingml/2006/main" xmlns:r="http://schemas.openxmlformats.org/officeDocument/2006/relationships" xmlns:p="http://schemas.openxmlformats.org/presentationml/2006/main">
+  <p:cSld>
+    <p:spTree>
+      <p:nvGrpSpPr>
+        <p:cNvPr id="1" name=""/>
+        <p:cNvGrpSpPr/>
+        <p:nvPr/>
+      </p:nvGrpSpPr>
+      <p:grpSpPr>
+        <a:xfrm>
+          <a:off x="0" y="0"/>
+          <a:ext cx="0" cy="0"/>
+          <a:chOff x="0" y="0"/>
+          <a:chExt cx="0" cy="0"/>
+        </a:xfrm>
+      </p:grpSpPr>
+      <p:sp>
+        <p:nvSpPr>
+          <p:cNvPr id="2" name="Slide Image Placeholder 1"/>
+          <p:cNvSpPr>
+            <a:spLocks noGrp="1" noRot="1" noChangeAspect="1"/>
+          </p:cNvSpPr>
+          <p:nvPr>
+            <p:ph type="sldImg"/>
+          </p:nvPr>
+        </p:nvSpPr>
+        <p:spPr/>
+      </p:sp>
+      <p:sp>
+        <p:nvSpPr>
+          <p:cNvPr id="3" name="Notes Placeholder 2"/>
+          <p:cNvSpPr>
+            <a:spLocks noGrp="1"/>
+          </p:cNvSpPr>
+          <p:nvPr>
+            <p:ph type="body" idx="1"/>
+          </p:nvPr>
+        </p:nvSpPr>
+        <p:spPr/>
+        <p:txBody>
+          <a:bodyPr/>
+          <a:lstStyle/>
+          <a:p>
+            <a:endParaRPr lang="es-MX" dirty="0"/>
+          </a:p>
+        </p:txBody>
+      </p:sp>
+      <p:sp>
+        <p:nvSpPr>
+          <p:cNvPr id="4" name="Slide Number Placeholder 3"/>
+          <p:cNvSpPr>
+            <a:spLocks noGrp="1"/>
+          </p:cNvSpPr>
+          <p:nvPr>
+            <p:ph type="sldNum" sz="quarter" idx="5"/>
+          </p:nvPr>
+        </p:nvSpPr>
+        <p:spPr/>
+        <p:txBody>
+          <a:bodyPr/>
+          <a:lstStyle/>
+          <a:p>
+            <a:fld id="{ECECFD69-5CF0-4C25-BF49-DC0CB7221DAA}" type="slidenum">
+              <a:rPr lang="es-MX" smtClean="0"/>
+              <a:t>18</a:t>
             </a:fld>
             <a:endParaRPr lang="es-MX"/>
           </a:p>
@@ -6221,7 +6476,7 @@
         </p:nvSpPr>
         <p:spPr>
           <a:xfrm>
-            <a:off x="1474075" y="2793788"/>
+            <a:off x="1474075" y="2896658"/>
             <a:ext cx="8927785" cy="401321"/>
           </a:xfrm>
           <a:prstGeom prst="rect">
@@ -6381,8 +6636,8 @@
         </p:nvSpPr>
         <p:spPr>
           <a:xfrm>
-            <a:off x="1627098" y="2136134"/>
-            <a:ext cx="9255321" cy="441453"/>
+            <a:off x="1627098" y="2159350"/>
+            <a:ext cx="9255321" cy="485598"/>
           </a:xfrm>
           <a:prstGeom prst="rect">
             <a:avLst/>
@@ -6397,7 +6652,7 @@
           <a:p>
             <a:pPr algn="ctr"/>
             <a:r>
-              <a:rPr lang="es-MX" b="0" i="0" u="none" strike="noStrike" dirty="0">
+              <a:rPr lang="es-MX" b="1" i="0" u="none" strike="noStrike" dirty="0">
                 <a:solidFill>
                   <a:srgbClr val="333333"/>
                 </a:solidFill>
@@ -6407,7 +6662,7 @@
               <a:t>log</a:t>
             </a:r>
             <a:r>
-              <a:rPr lang="es-MX" b="0" i="0" u="none" strike="noStrike" dirty="0">
+              <a:rPr lang="es-MX" b="1" i="0" u="none" strike="noStrike" dirty="0">
                 <a:solidFill>
                   <a:srgbClr val="333333"/>
                 </a:solidFill>
@@ -6417,7 +6672,7 @@
               <a:t>(</a:t>
             </a:r>
             <a:r>
-              <a:rPr lang="es-MX" b="0" i="0" u="none" strike="noStrike" dirty="0" err="1">
+              <a:rPr lang="es-MX" b="1" i="0" u="none" strike="noStrike" dirty="0" err="1">
                 <a:solidFill>
                   <a:srgbClr val="333333"/>
                 </a:solidFill>
@@ -6427,7 +6682,7 @@
               <a:t>wagei</a:t>
             </a:r>
             <a:r>
-              <a:rPr lang="es-MX" b="0" i="0" u="none" strike="noStrike" dirty="0">
+              <a:rPr lang="es-MX" b="1" i="0" u="none" strike="noStrike" dirty="0">
                 <a:solidFill>
                   <a:srgbClr val="333333"/>
                 </a:solidFill>
@@ -6437,7 +6692,7 @@
               <a:t>)=1.27+0.11∗</a:t>
             </a:r>
             <a:r>
-              <a:rPr lang="es-MX" b="0" i="0" u="none" strike="noStrike" dirty="0">
+              <a:rPr lang="es-MX" b="1" i="0" u="none" strike="noStrike" dirty="0">
                 <a:solidFill>
                   <a:srgbClr val="333333"/>
                 </a:solidFill>
@@ -6447,7 +6702,7 @@
               <a:t>educi</a:t>
             </a:r>
             <a:r>
-              <a:rPr lang="es-MX" b="0" i="0" u="none" strike="noStrike" dirty="0">
+              <a:rPr lang="es-MX" b="1" i="0" u="none" strike="noStrike" dirty="0">
                 <a:solidFill>
                   <a:srgbClr val="333333"/>
                 </a:solidFill>
@@ -6457,7 +6712,7 @@
               <a:t>+0.008∗</a:t>
             </a:r>
             <a:r>
-              <a:rPr lang="es-MX" b="0" i="0" u="none" strike="noStrike" dirty="0">
+              <a:rPr lang="es-MX" b="1" i="0" u="none" strike="noStrike" dirty="0">
                 <a:solidFill>
                   <a:srgbClr val="333333"/>
                 </a:solidFill>
@@ -6467,7 +6722,7 @@
               <a:t>experi</a:t>
             </a:r>
             <a:r>
-              <a:rPr lang="es-MX" b="0" i="0" u="none" strike="noStrike" dirty="0">
+              <a:rPr lang="es-MX" b="1" i="0" u="none" strike="noStrike" dirty="0">
                 <a:solidFill>
                   <a:srgbClr val="333333"/>
                 </a:solidFill>
@@ -6477,7 +6732,7 @@
               <a:t>+0.000007∗</a:t>
             </a:r>
             <a:r>
-              <a:rPr lang="es-MX" b="0" i="0" u="none" strike="noStrike" dirty="0">
+              <a:rPr lang="es-MX" b="1" i="0" u="none" strike="noStrike" dirty="0">
                 <a:solidFill>
                   <a:srgbClr val="333333"/>
                 </a:solidFill>
@@ -6487,7 +6742,7 @@
               <a:t>faminci</a:t>
             </a:r>
             <a:r>
-              <a:rPr lang="es-MX" b="0" i="0" u="none" strike="noStrike" dirty="0">
+              <a:rPr lang="es-MX" b="1" i="0" u="none" strike="noStrike" dirty="0">
                 <a:solidFill>
                   <a:srgbClr val="333333"/>
                 </a:solidFill>
@@ -6497,7 +6752,7 @@
               <a:t>−0.22∗</a:t>
             </a:r>
             <a:r>
-              <a:rPr lang="es-MX" b="0" i="0" u="none" strike="noStrike" dirty="0">
+              <a:rPr lang="es-MX" b="1" i="0" u="none" strike="noStrike" dirty="0">
                 <a:solidFill>
                   <a:srgbClr val="333333"/>
                 </a:solidFill>
@@ -6507,7 +6762,7 @@
               <a:t>femalei</a:t>
             </a:r>
             <a:r>
-              <a:rPr lang="es-MX" b="0" i="0" u="none" strike="noStrike" dirty="0">
+              <a:rPr lang="es-MX" b="1" i="0" u="none" strike="noStrike" dirty="0">
                 <a:solidFill>
                   <a:srgbClr val="333333"/>
                 </a:solidFill>
@@ -6517,7 +6772,7 @@
               <a:t>+0.13∗</a:t>
             </a:r>
             <a:r>
-              <a:rPr lang="es-MX" b="0" i="0" u="none" strike="noStrike" dirty="0">
+              <a:rPr lang="es-MX" b="1" i="0" u="none" strike="noStrike" dirty="0">
                 <a:solidFill>
                   <a:srgbClr val="333333"/>
                 </a:solidFill>
@@ -6527,7 +6782,7 @@
               <a:t>metroi</a:t>
             </a:r>
             <a:r>
-              <a:rPr lang="es-MX" b="0" i="0" u="none" strike="noStrike" dirty="0">
+              <a:rPr lang="es-MX" b="1" i="0" u="none" strike="noStrike" dirty="0">
                 <a:solidFill>
                   <a:srgbClr val="333333"/>
                 </a:solidFill>
@@ -6537,7 +6792,7 @@
               <a:t>+</a:t>
             </a:r>
             <a:r>
-              <a:rPr lang="el-GR" b="0" i="0" u="none" strike="noStrike" dirty="0">
+              <a:rPr lang="el-GR" b="1" i="0" u="none" strike="noStrike" dirty="0">
                 <a:solidFill>
                   <a:srgbClr val="333333"/>
                 </a:solidFill>
@@ -6547,7 +6802,7 @@
               <a:t>ε</a:t>
             </a:r>
             <a:r>
-              <a:rPr lang="es-MX" b="0" i="0" u="none" strike="noStrike" dirty="0">
+              <a:rPr lang="es-MX" b="1" i="0" u="none" strike="noStrike" dirty="0">
                 <a:solidFill>
                   <a:srgbClr val="333333"/>
                 </a:solidFill>
@@ -6557,9 +6812,9 @@
               <a:t>i</a:t>
             </a:r>
             <a:br>
-              <a:rPr lang="es-MX" dirty="0"/>
+              <a:rPr lang="es-MX" b="1" dirty="0"/>
             </a:br>
-            <a:endParaRPr lang="es-MX" dirty="0"/>
+            <a:endParaRPr lang="es-MX" b="1" dirty="0"/>
           </a:p>
         </p:txBody>
       </p:sp>
@@ -6904,6 +7159,48 @@
                 <a:latin typeface="Helvetica Neue"/>
               </a:rPr>
               <a:t>Los errores aparentan estar más cercanos y centrados alrededor del cero</a:t>
+            </a:r>
+          </a:p>
+        </p:txBody>
+      </p:sp>
+      <p:sp>
+        <p:nvSpPr>
+          <p:cNvPr id="5" name="TextBox 4">
+            <a:extLst>
+              <a:ext uri="{FF2B5EF4-FFF2-40B4-BE49-F238E27FC236}">
+                <a16:creationId xmlns:a16="http://schemas.microsoft.com/office/drawing/2014/main" id="{0761419E-5DBF-F462-3415-5ED39C57466C}"/>
+              </a:ext>
+            </a:extLst>
+          </p:cNvPr>
+          <p:cNvSpPr txBox="1"/>
+          <p:nvPr/>
+        </p:nvSpPr>
+        <p:spPr>
+          <a:xfrm>
+            <a:off x="3823771" y="5845341"/>
+            <a:ext cx="4925370" cy="338554"/>
+          </a:xfrm>
+          <a:prstGeom prst="rect">
+            <a:avLst/>
+          </a:prstGeom>
+          <a:noFill/>
+        </p:spPr>
+        <p:txBody>
+          <a:bodyPr wrap="square">
+            <a:spAutoFit/>
+          </a:bodyPr>
+          <a:lstStyle/>
+          <a:p>
+            <a:pPr algn="l"/>
+            <a:r>
+              <a:rPr lang="es-MX" sz="1600" i="0" dirty="0">
+                <a:solidFill>
+                  <a:srgbClr val="333333"/>
+                </a:solidFill>
+                <a:effectLst/>
+                <a:latin typeface="Helvetica Neue"/>
+              </a:rPr>
+              <a:t>Evaluación general de los error del modelo MCO3</a:t>
             </a:r>
           </a:p>
         </p:txBody>
@@ -7630,13 +7927,13 @@
           <p:nvPr>
             <p:extLst>
               <p:ext uri="{D42A27DB-BD31-4B8C-83A1-F6EECF244321}">
-                <p14:modId xmlns:p14="http://schemas.microsoft.com/office/powerpoint/2010/main" val="2688563008"/>
+                <p14:modId xmlns:p14="http://schemas.microsoft.com/office/powerpoint/2010/main" val="850166139"/>
               </p:ext>
             </p:extLst>
           </p:nvPr>
         </p:nvGraphicFramePr>
         <p:xfrm>
-          <a:off x="510558" y="1428326"/>
+          <a:off x="510558" y="1016846"/>
           <a:ext cx="11010882" cy="3418840"/>
         </p:xfrm>
         <a:graphic>
@@ -9286,6 +9583,61 @@
           </a:graphicData>
         </a:graphic>
       </p:graphicFrame>
+      <p:sp>
+        <p:nvSpPr>
+          <p:cNvPr id="2" name="TextBox 1">
+            <a:extLst>
+              <a:ext uri="{FF2B5EF4-FFF2-40B4-BE49-F238E27FC236}">
+                <a16:creationId xmlns:a16="http://schemas.microsoft.com/office/drawing/2014/main" id="{332A3A77-D130-5FDA-3410-48B52FA4B330}"/>
+              </a:ext>
+            </a:extLst>
+          </p:cNvPr>
+          <p:cNvSpPr txBox="1"/>
+          <p:nvPr/>
+        </p:nvSpPr>
+        <p:spPr>
+          <a:xfrm>
+            <a:off x="396240" y="4739180"/>
+            <a:ext cx="11399520" cy="923330"/>
+          </a:xfrm>
+          <a:prstGeom prst="rect">
+            <a:avLst/>
+          </a:prstGeom>
+          <a:noFill/>
+        </p:spPr>
+        <p:txBody>
+          <a:bodyPr wrap="square">
+            <a:spAutoFit/>
+          </a:bodyPr>
+          <a:lstStyle/>
+          <a:p>
+            <a:pPr algn="ctr"/>
+            <a:r>
+              <a:rPr lang="es-ES" sz="1800" dirty="0"/>
+              <a:t>Recordar si no se cumplen los supuestos de Gauss </a:t>
+            </a:r>
+            <a:r>
+              <a:rPr lang="es-ES" sz="1800" dirty="0" err="1"/>
+              <a:t>Markov</a:t>
+            </a:r>
+            <a:r>
+              <a:rPr lang="es-ES" sz="1800" dirty="0"/>
+              <a:t> se dice que los coeficientes </a:t>
+            </a:r>
+            <a:r>
+              <a:rPr lang="es-ES" sz="1800" dirty="0">
+                <a:latin typeface="Cambria Math" panose="02040503050406030204" pitchFamily="18" charset="0"/>
+                <a:ea typeface="Cambria Math" panose="02040503050406030204" pitchFamily="18" charset="0"/>
+              </a:rPr>
+              <a:t>𝜷 del modelo </a:t>
+            </a:r>
+            <a:r>
+              <a:rPr lang="es-MX" dirty="0"/>
+              <a:t>MCO son insesgados y consistentes, pero ineficientes, lo que conduce a resultados incorrectos para las pruebas estadísticas.</a:t>
+            </a:r>
+          </a:p>
+        </p:txBody>
+      </p:sp>
     </p:spTree>
     <p:extLst>
       <p:ext uri="{BB962C8B-B14F-4D97-AF65-F5344CB8AC3E}">
@@ -9717,6 +10069,2474 @@
         <p:spPr>
           <a:xfrm>
             <a:off x="510558" y="196996"/>
+            <a:ext cx="11205192" cy="594360"/>
+          </a:xfrm>
+          <a:prstGeom prst="rect">
+            <a:avLst/>
+          </a:prstGeom>
+        </p:spPr>
+        <p:txBody>
+          <a:bodyPr/>
+          <a:lstStyle>
+            <a:lvl1pPr algn="l" defTabSz="914400" rtl="0" eaLnBrk="1" latinLnBrk="0" hangingPunct="1">
+              <a:lnSpc>
+                <a:spcPct val="85000"/>
+              </a:lnSpc>
+              <a:spcBef>
+                <a:spcPct val="0"/>
+              </a:spcBef>
+              <a:buNone/>
+              <a:defRPr sz="4800" kern="1200" spc="-50" baseline="0">
+                <a:solidFill>
+                  <a:schemeClr val="tx1">
+                    <a:lumMod val="75000"/>
+                    <a:lumOff val="25000"/>
+                  </a:schemeClr>
+                </a:solidFill>
+                <a:latin typeface="+mj-lt"/>
+                <a:ea typeface="+mj-ea"/>
+                <a:cs typeface="+mj-cs"/>
+              </a:defRPr>
+            </a:lvl1pPr>
+          </a:lstStyle>
+          <a:p>
+            <a:r>
+              <a:rPr lang="en-US" sz="3200" b="1" dirty="0" err="1">
+                <a:solidFill>
+                  <a:schemeClr val="accent1"/>
+                </a:solidFill>
+              </a:rPr>
+              <a:t>Aplicación</a:t>
+            </a:r>
+            <a:r>
+              <a:rPr lang="en-US" sz="3200" b="1" dirty="0">
+                <a:solidFill>
+                  <a:schemeClr val="accent1"/>
+                </a:solidFill>
+              </a:rPr>
+              <a:t> del </a:t>
+            </a:r>
+            <a:r>
+              <a:rPr lang="en-US" sz="3200" b="1" dirty="0" err="1">
+                <a:solidFill>
+                  <a:schemeClr val="accent1"/>
+                </a:solidFill>
+              </a:rPr>
+              <a:t>modelo</a:t>
+            </a:r>
+            <a:r>
+              <a:rPr lang="en-US" sz="3200" b="1" dirty="0">
+                <a:solidFill>
+                  <a:schemeClr val="accent1"/>
+                </a:solidFill>
+              </a:rPr>
+              <a:t> de </a:t>
+            </a:r>
+            <a:r>
+              <a:rPr lang="en-US" sz="3200" b="1" dirty="0" err="1">
+                <a:solidFill>
+                  <a:schemeClr val="accent1"/>
+                </a:solidFill>
+              </a:rPr>
+              <a:t>Mínimos</a:t>
+            </a:r>
+            <a:r>
+              <a:rPr lang="en-US" sz="3200" b="1" dirty="0">
+                <a:solidFill>
+                  <a:schemeClr val="accent1"/>
+                </a:solidFill>
+              </a:rPr>
+              <a:t> </a:t>
+            </a:r>
+            <a:r>
+              <a:rPr lang="en-US" sz="3200" b="1" dirty="0" err="1">
+                <a:solidFill>
+                  <a:schemeClr val="accent1"/>
+                </a:solidFill>
+              </a:rPr>
+              <a:t>Cuadrados</a:t>
+            </a:r>
+            <a:r>
+              <a:rPr lang="en-US" sz="3200" b="1" dirty="0">
+                <a:solidFill>
+                  <a:schemeClr val="accent1"/>
+                </a:solidFill>
+              </a:rPr>
+              <a:t> </a:t>
+            </a:r>
+            <a:r>
+              <a:rPr lang="en-US" sz="3200" b="1" dirty="0" err="1">
+                <a:solidFill>
+                  <a:schemeClr val="accent1"/>
+                </a:solidFill>
+              </a:rPr>
+              <a:t>Generalizados</a:t>
+            </a:r>
+            <a:r>
+              <a:rPr lang="en-US" sz="3200" b="1" dirty="0">
+                <a:solidFill>
+                  <a:schemeClr val="accent1"/>
+                </a:solidFill>
+              </a:rPr>
+              <a:t> (MCG1)</a:t>
+            </a:r>
+            <a:endParaRPr lang="es-MX" sz="3200" b="1" dirty="0">
+              <a:solidFill>
+                <a:schemeClr val="accent1"/>
+              </a:solidFill>
+            </a:endParaRPr>
+          </a:p>
+        </p:txBody>
+      </p:sp>
+      <p:sp>
+        <p:nvSpPr>
+          <p:cNvPr id="3" name="TextBox 2">
+            <a:extLst>
+              <a:ext uri="{FF2B5EF4-FFF2-40B4-BE49-F238E27FC236}">
+                <a16:creationId xmlns:a16="http://schemas.microsoft.com/office/drawing/2014/main" id="{5E532800-B3ED-4623-23DE-9E6F29C42DA1}"/>
+              </a:ext>
+            </a:extLst>
+          </p:cNvPr>
+          <p:cNvSpPr txBox="1"/>
+          <p:nvPr/>
+        </p:nvSpPr>
+        <p:spPr>
+          <a:xfrm>
+            <a:off x="0" y="617927"/>
+            <a:ext cx="12192000" cy="369332"/>
+          </a:xfrm>
+          <a:prstGeom prst="rect">
+            <a:avLst/>
+          </a:prstGeom>
+          <a:noFill/>
+        </p:spPr>
+        <p:txBody>
+          <a:bodyPr wrap="square">
+            <a:spAutoFit/>
+          </a:bodyPr>
+          <a:lstStyle/>
+          <a:p>
+            <a:r>
+              <a:rPr lang="es-ES" sz="1800" b="0" i="0" u="none" strike="noStrike" kern="1200" dirty="0">
+                <a:solidFill>
+                  <a:schemeClr val="dk1"/>
+                </a:solidFill>
+                <a:effectLst/>
+                <a:latin typeface="+mn-lt"/>
+                <a:ea typeface="+mn-ea"/>
+                <a:cs typeface="+mn-cs"/>
+              </a:rPr>
+              <a:t>Se decidió correr un nuevo modelo de MCG1 tomando en cuenta la posible correlación de errores a tiempo t-5</a:t>
+            </a:r>
+            <a:endParaRPr lang="es-MX" sz="1800" dirty="0"/>
+          </a:p>
+        </p:txBody>
+      </p:sp>
+      <p:sp>
+        <p:nvSpPr>
+          <p:cNvPr id="2" name="Rectangle 1">
+            <a:extLst>
+              <a:ext uri="{FF2B5EF4-FFF2-40B4-BE49-F238E27FC236}">
+                <a16:creationId xmlns:a16="http://schemas.microsoft.com/office/drawing/2014/main" id="{7353D332-B2E6-A989-E2C5-F1FAEB42CBC4}"/>
+              </a:ext>
+            </a:extLst>
+          </p:cNvPr>
+          <p:cNvSpPr>
+            <a:spLocks noChangeArrowheads="1"/>
+          </p:cNvSpPr>
+          <p:nvPr/>
+        </p:nvSpPr>
+        <p:spPr bwMode="auto">
+          <a:xfrm>
+            <a:off x="670560" y="922814"/>
+            <a:ext cx="10228562" cy="1356761"/>
+          </a:xfrm>
+          <a:prstGeom prst="rect">
+            <a:avLst/>
+          </a:prstGeom>
+          <a:solidFill>
+            <a:srgbClr val="F5F5F5"/>
+          </a:solidFill>
+          <a:ln>
+            <a:noFill/>
+          </a:ln>
+          <a:effectLst/>
+          <a:extLst>
+            <a:ext uri="{91240B29-F687-4F45-9708-019B960494DF}">
+              <a14:hiddenLine xmlns:a14="http://schemas.microsoft.com/office/drawing/2010/main" w="9525">
+                <a:solidFill>
+                  <a:schemeClr val="tx1"/>
+                </a:solidFill>
+                <a:miter lim="800000"/>
+                <a:headEnd/>
+                <a:tailEnd/>
+              </a14:hiddenLine>
+            </a:ext>
+            <a:ext uri="{AF507438-7753-43E0-B8FC-AC1667EBCBE1}">
+              <a14:hiddenEffects xmlns:a14="http://schemas.microsoft.com/office/drawing/2010/main">
+                <a:effectLst>
+                  <a:outerShdw dist="35921" dir="2700000" algn="ctr" rotWithShape="0">
+                    <a:schemeClr val="bg2"/>
+                  </a:outerShdw>
+                </a:effectLst>
+              </a14:hiddenEffects>
+            </a:ext>
+          </a:extLst>
+        </p:spPr>
+        <p:txBody>
+          <a:bodyPr vert="horz" wrap="square" lIns="0" tIns="0" rIns="0" bIns="63480" numCol="1" anchor="ctr" anchorCtr="0" compatLnSpc="1">
+            <a:prstTxWarp prst="textNoShape">
+              <a:avLst/>
+            </a:prstTxWarp>
+            <a:spAutoFit/>
+          </a:bodyPr>
+          <a:lstStyle/>
+          <a:p>
+            <a:pPr eaLnBrk="0" fontAlgn="base" hangingPunct="0">
+              <a:spcBef>
+                <a:spcPct val="0"/>
+              </a:spcBef>
+              <a:spcAft>
+                <a:spcPct val="0"/>
+              </a:spcAft>
+            </a:pPr>
+            <a:endParaRPr lang="es-MX" altLang="es-MX" sz="1200" dirty="0">
+              <a:solidFill>
+                <a:srgbClr val="333333"/>
+              </a:solidFill>
+            </a:endParaRPr>
+          </a:p>
+          <a:p>
+            <a:pPr eaLnBrk="0" fontAlgn="base" hangingPunct="0">
+              <a:spcBef>
+                <a:spcPct val="0"/>
+              </a:spcBef>
+              <a:spcAft>
+                <a:spcPct val="0"/>
+              </a:spcAft>
+            </a:pPr>
+            <a:r>
+              <a:rPr lang="es-MX" altLang="es-MX" sz="1200" dirty="0" err="1">
+                <a:solidFill>
+                  <a:srgbClr val="333333"/>
+                </a:solidFill>
+              </a:rPr>
+              <a:t>library</a:t>
+            </a:r>
+            <a:r>
+              <a:rPr lang="es-MX" altLang="es-MX" sz="1200" dirty="0">
+                <a:solidFill>
+                  <a:srgbClr val="333333"/>
+                </a:solidFill>
+              </a:rPr>
+              <a:t>(</a:t>
+            </a:r>
+            <a:r>
+              <a:rPr lang="es-MX" altLang="es-MX" sz="1200" dirty="0" err="1">
+                <a:solidFill>
+                  <a:srgbClr val="333333"/>
+                </a:solidFill>
+              </a:rPr>
+              <a:t>nlme</a:t>
+            </a:r>
+            <a:r>
+              <a:rPr lang="es-MX" altLang="es-MX" sz="1200" dirty="0">
+                <a:solidFill>
+                  <a:srgbClr val="333333"/>
+                </a:solidFill>
+              </a:rPr>
+              <a:t>)</a:t>
+            </a:r>
+          </a:p>
+          <a:p>
+            <a:pPr eaLnBrk="0" fontAlgn="base" hangingPunct="0">
+              <a:spcBef>
+                <a:spcPct val="0"/>
+              </a:spcBef>
+              <a:spcAft>
+                <a:spcPct val="0"/>
+              </a:spcAft>
+            </a:pPr>
+            <a:endParaRPr lang="es-MX" altLang="es-MX" sz="1200" dirty="0">
+              <a:solidFill>
+                <a:srgbClr val="333333"/>
+              </a:solidFill>
+            </a:endParaRPr>
+          </a:p>
+          <a:p>
+            <a:pPr eaLnBrk="0" fontAlgn="base" hangingPunct="0">
+              <a:spcBef>
+                <a:spcPct val="0"/>
+              </a:spcBef>
+              <a:spcAft>
+                <a:spcPct val="0"/>
+              </a:spcAft>
+            </a:pPr>
+            <a:r>
+              <a:rPr lang="es-MX" altLang="es-MX" sz="1200" dirty="0">
+                <a:solidFill>
+                  <a:srgbClr val="333333"/>
+                </a:solidFill>
+              </a:rPr>
+              <a:t>glm_1_wage_train_data &lt;- </a:t>
+            </a:r>
+            <a:r>
+              <a:rPr lang="es-MX" altLang="es-MX" sz="1200" dirty="0" err="1">
+                <a:solidFill>
+                  <a:srgbClr val="333333"/>
+                </a:solidFill>
+              </a:rPr>
+              <a:t>gls</a:t>
+            </a:r>
+            <a:r>
+              <a:rPr lang="es-MX" altLang="es-MX" sz="1200" dirty="0">
+                <a:solidFill>
+                  <a:srgbClr val="333333"/>
+                </a:solidFill>
+              </a:rPr>
+              <a:t>(log(</a:t>
+            </a:r>
+            <a:r>
+              <a:rPr lang="es-MX" altLang="es-MX" sz="1200" dirty="0" err="1">
+                <a:solidFill>
+                  <a:srgbClr val="333333"/>
+                </a:solidFill>
+              </a:rPr>
+              <a:t>wage</a:t>
+            </a:r>
+            <a:r>
+              <a:rPr lang="es-MX" altLang="es-MX" sz="1200" dirty="0">
+                <a:solidFill>
+                  <a:srgbClr val="333333"/>
+                </a:solidFill>
+              </a:rPr>
+              <a:t>) ~ </a:t>
+            </a:r>
+            <a:r>
+              <a:rPr lang="es-MX" altLang="es-MX" sz="1200" dirty="0" err="1">
+                <a:solidFill>
+                  <a:srgbClr val="333333"/>
+                </a:solidFill>
+              </a:rPr>
+              <a:t>educ</a:t>
+            </a:r>
+            <a:r>
+              <a:rPr lang="es-MX" altLang="es-MX" sz="1200" dirty="0">
+                <a:solidFill>
+                  <a:srgbClr val="333333"/>
+                </a:solidFill>
+              </a:rPr>
+              <a:t> + </a:t>
+            </a:r>
+            <a:r>
+              <a:rPr lang="es-MX" altLang="es-MX" sz="1200" dirty="0" err="1">
+                <a:solidFill>
+                  <a:srgbClr val="333333"/>
+                </a:solidFill>
+              </a:rPr>
+              <a:t>exper</a:t>
+            </a:r>
+            <a:r>
+              <a:rPr lang="es-MX" altLang="es-MX" sz="1200" dirty="0">
+                <a:solidFill>
+                  <a:srgbClr val="333333"/>
+                </a:solidFill>
+              </a:rPr>
+              <a:t> + </a:t>
+            </a:r>
+            <a:r>
+              <a:rPr lang="es-MX" altLang="es-MX" sz="1200" dirty="0" err="1">
+                <a:solidFill>
+                  <a:srgbClr val="333333"/>
+                </a:solidFill>
+              </a:rPr>
+              <a:t>faminc</a:t>
+            </a:r>
+            <a:r>
+              <a:rPr lang="es-MX" altLang="es-MX" sz="1200" dirty="0">
+                <a:solidFill>
+                  <a:srgbClr val="333333"/>
+                </a:solidFill>
+              </a:rPr>
+              <a:t> + </a:t>
+            </a:r>
+            <a:r>
+              <a:rPr lang="es-MX" altLang="es-MX" sz="1200" dirty="0" err="1">
+                <a:solidFill>
+                  <a:srgbClr val="333333"/>
+                </a:solidFill>
+              </a:rPr>
+              <a:t>female</a:t>
+            </a:r>
+            <a:r>
+              <a:rPr lang="es-MX" altLang="es-MX" sz="1200" dirty="0">
+                <a:solidFill>
+                  <a:srgbClr val="333333"/>
+                </a:solidFill>
+              </a:rPr>
+              <a:t> + metro, </a:t>
+            </a:r>
+            <a:r>
+              <a:rPr lang="es-MX" altLang="es-MX" sz="1200" dirty="0" err="1">
+                <a:solidFill>
+                  <a:srgbClr val="333333"/>
+                </a:solidFill>
+              </a:rPr>
+              <a:t>correlation</a:t>
+            </a:r>
+            <a:r>
+              <a:rPr lang="es-MX" altLang="es-MX" sz="1200" dirty="0">
+                <a:solidFill>
+                  <a:srgbClr val="333333"/>
+                </a:solidFill>
+              </a:rPr>
+              <a:t> = </a:t>
+            </a:r>
+            <a:r>
+              <a:rPr lang="es-MX" altLang="es-MX" sz="1200" dirty="0" err="1">
+                <a:solidFill>
+                  <a:srgbClr val="333333"/>
+                </a:solidFill>
+              </a:rPr>
+              <a:t>corARMA</a:t>
+            </a:r>
+            <a:r>
+              <a:rPr lang="es-MX" altLang="es-MX" sz="1200" dirty="0">
+                <a:solidFill>
+                  <a:srgbClr val="333333"/>
+                </a:solidFill>
+              </a:rPr>
+              <a:t>(q = 5), </a:t>
+            </a:r>
+            <a:r>
+              <a:rPr lang="es-MX" altLang="es-MX" sz="1200" dirty="0" err="1">
+                <a:solidFill>
+                  <a:srgbClr val="333333"/>
+                </a:solidFill>
+              </a:rPr>
+              <a:t>method</a:t>
+            </a:r>
+            <a:r>
+              <a:rPr lang="es-MX" altLang="es-MX" sz="1200" dirty="0">
+                <a:solidFill>
+                  <a:srgbClr val="333333"/>
+                </a:solidFill>
+              </a:rPr>
+              <a:t> = "ML", data = </a:t>
+            </a:r>
+            <a:r>
+              <a:rPr lang="es-MX" altLang="es-MX" sz="1200" dirty="0" err="1">
+                <a:solidFill>
+                  <a:srgbClr val="333333"/>
+                </a:solidFill>
+              </a:rPr>
+              <a:t>wage_train_data</a:t>
+            </a:r>
+            <a:r>
+              <a:rPr lang="es-MX" altLang="es-MX" sz="1200" dirty="0">
+                <a:solidFill>
+                  <a:srgbClr val="333333"/>
+                </a:solidFill>
+              </a:rPr>
+              <a:t>)</a:t>
+            </a:r>
+          </a:p>
+          <a:p>
+            <a:pPr eaLnBrk="0" fontAlgn="base" hangingPunct="0">
+              <a:spcBef>
+                <a:spcPct val="0"/>
+              </a:spcBef>
+              <a:spcAft>
+                <a:spcPct val="0"/>
+              </a:spcAft>
+            </a:pPr>
+            <a:endParaRPr lang="es-MX" altLang="es-MX" sz="1200" dirty="0">
+              <a:solidFill>
+                <a:srgbClr val="333333"/>
+              </a:solidFill>
+            </a:endParaRPr>
+          </a:p>
+          <a:p>
+            <a:pPr eaLnBrk="0" fontAlgn="base" hangingPunct="0">
+              <a:spcBef>
+                <a:spcPct val="0"/>
+              </a:spcBef>
+              <a:spcAft>
+                <a:spcPct val="0"/>
+              </a:spcAft>
+            </a:pPr>
+            <a:r>
+              <a:rPr lang="es-MX" altLang="es-MX" sz="1200" dirty="0" err="1">
+                <a:solidFill>
+                  <a:srgbClr val="333333"/>
+                </a:solidFill>
+              </a:rPr>
+              <a:t>summary</a:t>
+            </a:r>
+            <a:r>
+              <a:rPr lang="es-MX" altLang="es-MX" sz="1200" dirty="0">
+                <a:solidFill>
+                  <a:srgbClr val="333333"/>
+                </a:solidFill>
+              </a:rPr>
+              <a:t>(glm_1_wage_train_data)</a:t>
+            </a:r>
+          </a:p>
+          <a:p>
+            <a:pPr eaLnBrk="0" fontAlgn="base" hangingPunct="0">
+              <a:spcBef>
+                <a:spcPct val="0"/>
+              </a:spcBef>
+              <a:spcAft>
+                <a:spcPct val="0"/>
+              </a:spcAft>
+            </a:pPr>
+            <a:endParaRPr lang="es-MX" altLang="es-MX" sz="1200" dirty="0">
+              <a:solidFill>
+                <a:srgbClr val="333333"/>
+              </a:solidFill>
+            </a:endParaRPr>
+          </a:p>
+        </p:txBody>
+      </p:sp>
+      <p:sp>
+        <p:nvSpPr>
+          <p:cNvPr id="13" name="Rectangle 3">
+            <a:extLst>
+              <a:ext uri="{FF2B5EF4-FFF2-40B4-BE49-F238E27FC236}">
+                <a16:creationId xmlns:a16="http://schemas.microsoft.com/office/drawing/2014/main" id="{7B53B837-C20D-A715-5D9D-70C9FC0DF7BA}"/>
+              </a:ext>
+            </a:extLst>
+          </p:cNvPr>
+          <p:cNvSpPr>
+            <a:spLocks noChangeArrowheads="1"/>
+          </p:cNvSpPr>
+          <p:nvPr/>
+        </p:nvSpPr>
+        <p:spPr bwMode="auto">
+          <a:xfrm>
+            <a:off x="9475387" y="3001732"/>
+            <a:ext cx="2515127" cy="2280091"/>
+          </a:xfrm>
+          <a:prstGeom prst="rect">
+            <a:avLst/>
+          </a:prstGeom>
+          <a:solidFill>
+            <a:srgbClr val="FFFFFF"/>
+          </a:solidFill>
+          <a:ln>
+            <a:noFill/>
+          </a:ln>
+          <a:effectLst/>
+          <a:extLst>
+            <a:ext uri="{91240B29-F687-4F45-9708-019B960494DF}">
+              <a14:hiddenLine xmlns:a14="http://schemas.microsoft.com/office/drawing/2010/main" w="9525">
+                <a:solidFill>
+                  <a:schemeClr val="tx1"/>
+                </a:solidFill>
+                <a:miter lim="800000"/>
+                <a:headEnd/>
+                <a:tailEnd/>
+              </a14:hiddenLine>
+            </a:ext>
+            <a:ext uri="{AF507438-7753-43E0-B8FC-AC1667EBCBE1}">
+              <a14:hiddenEffects xmlns:a14="http://schemas.microsoft.com/office/drawing/2010/main">
+                <a:effectLst>
+                  <a:outerShdw dist="35921" dir="2700000" algn="ctr" rotWithShape="0">
+                    <a:schemeClr val="bg2"/>
+                  </a:outerShdw>
+                </a:effectLst>
+              </a14:hiddenEffects>
+            </a:ext>
+          </a:extLst>
+        </p:spPr>
+        <p:txBody>
+          <a:bodyPr vert="horz" wrap="square" lIns="91440" tIns="0" rIns="91440" bIns="63480" numCol="1" anchor="ctr" anchorCtr="0" compatLnSpc="1">
+            <a:prstTxWarp prst="textNoShape">
+              <a:avLst/>
+            </a:prstTxWarp>
+            <a:spAutoFit/>
+          </a:bodyPr>
+          <a:lstStyle>
+            <a:lvl1pPr eaLnBrk="0" fontAlgn="base" hangingPunct="0">
+              <a:spcBef>
+                <a:spcPct val="0"/>
+              </a:spcBef>
+              <a:spcAft>
+                <a:spcPct val="0"/>
+              </a:spcAft>
+              <a:defRPr>
+                <a:solidFill>
+                  <a:schemeClr val="tx1"/>
+                </a:solidFill>
+                <a:latin typeface="Arial" panose="020B0604020202020204" pitchFamily="34" charset="0"/>
+              </a:defRPr>
+            </a:lvl1pPr>
+            <a:lvl2pPr eaLnBrk="0" fontAlgn="base" hangingPunct="0">
+              <a:spcBef>
+                <a:spcPct val="0"/>
+              </a:spcBef>
+              <a:spcAft>
+                <a:spcPct val="0"/>
+              </a:spcAft>
+              <a:defRPr>
+                <a:solidFill>
+                  <a:schemeClr val="tx1"/>
+                </a:solidFill>
+                <a:latin typeface="Arial" panose="020B0604020202020204" pitchFamily="34" charset="0"/>
+              </a:defRPr>
+            </a:lvl2pPr>
+            <a:lvl3pPr eaLnBrk="0" fontAlgn="base" hangingPunct="0">
+              <a:spcBef>
+                <a:spcPct val="0"/>
+              </a:spcBef>
+              <a:spcAft>
+                <a:spcPct val="0"/>
+              </a:spcAft>
+              <a:defRPr>
+                <a:solidFill>
+                  <a:schemeClr val="tx1"/>
+                </a:solidFill>
+                <a:latin typeface="Arial" panose="020B0604020202020204" pitchFamily="34" charset="0"/>
+              </a:defRPr>
+            </a:lvl3pPr>
+            <a:lvl4pPr eaLnBrk="0" fontAlgn="base" hangingPunct="0">
+              <a:spcBef>
+                <a:spcPct val="0"/>
+              </a:spcBef>
+              <a:spcAft>
+                <a:spcPct val="0"/>
+              </a:spcAft>
+              <a:defRPr>
+                <a:solidFill>
+                  <a:schemeClr val="tx1"/>
+                </a:solidFill>
+                <a:latin typeface="Arial" panose="020B0604020202020204" pitchFamily="34" charset="0"/>
+              </a:defRPr>
+            </a:lvl4pPr>
+            <a:lvl5pPr eaLnBrk="0" fontAlgn="base" hangingPunct="0">
+              <a:spcBef>
+                <a:spcPct val="0"/>
+              </a:spcBef>
+              <a:spcAft>
+                <a:spcPct val="0"/>
+              </a:spcAft>
+              <a:defRPr>
+                <a:solidFill>
+                  <a:schemeClr val="tx1"/>
+                </a:solidFill>
+                <a:latin typeface="Arial" panose="020B0604020202020204" pitchFamily="34" charset="0"/>
+              </a:defRPr>
+            </a:lvl5pPr>
+            <a:lvl6pPr eaLnBrk="0" fontAlgn="base" hangingPunct="0">
+              <a:spcBef>
+                <a:spcPct val="0"/>
+              </a:spcBef>
+              <a:spcAft>
+                <a:spcPct val="0"/>
+              </a:spcAft>
+              <a:defRPr>
+                <a:solidFill>
+                  <a:schemeClr val="tx1"/>
+                </a:solidFill>
+                <a:latin typeface="Arial" panose="020B0604020202020204" pitchFamily="34" charset="0"/>
+              </a:defRPr>
+            </a:lvl6pPr>
+            <a:lvl7pPr eaLnBrk="0" fontAlgn="base" hangingPunct="0">
+              <a:spcBef>
+                <a:spcPct val="0"/>
+              </a:spcBef>
+              <a:spcAft>
+                <a:spcPct val="0"/>
+              </a:spcAft>
+              <a:defRPr>
+                <a:solidFill>
+                  <a:schemeClr val="tx1"/>
+                </a:solidFill>
+                <a:latin typeface="Arial" panose="020B0604020202020204" pitchFamily="34" charset="0"/>
+              </a:defRPr>
+            </a:lvl7pPr>
+            <a:lvl8pPr eaLnBrk="0" fontAlgn="base" hangingPunct="0">
+              <a:spcBef>
+                <a:spcPct val="0"/>
+              </a:spcBef>
+              <a:spcAft>
+                <a:spcPct val="0"/>
+              </a:spcAft>
+              <a:defRPr>
+                <a:solidFill>
+                  <a:schemeClr val="tx1"/>
+                </a:solidFill>
+                <a:latin typeface="Arial" panose="020B0604020202020204" pitchFamily="34" charset="0"/>
+              </a:defRPr>
+            </a:lvl8pPr>
+            <a:lvl9pPr eaLnBrk="0" fontAlgn="base" hangingPunct="0">
+              <a:spcBef>
+                <a:spcPct val="0"/>
+              </a:spcBef>
+              <a:spcAft>
+                <a:spcPct val="0"/>
+              </a:spcAft>
+              <a:defRPr>
+                <a:solidFill>
+                  <a:schemeClr val="tx1"/>
+                </a:solidFill>
+                <a:latin typeface="Arial" panose="020B0604020202020204" pitchFamily="34" charset="0"/>
+              </a:defRPr>
+            </a:lvl9pPr>
+          </a:lstStyle>
+          <a:p>
+            <a:pPr marL="0" marR="0" lvl="0" indent="0" eaLnBrk="1" fontAlgn="base" hangingPunct="1">
+              <a:lnSpc>
+                <a:spcPct val="100000"/>
+              </a:lnSpc>
+              <a:spcBef>
+                <a:spcPct val="0"/>
+              </a:spcBef>
+              <a:spcAft>
+                <a:spcPct val="0"/>
+              </a:spcAft>
+              <a:buClrTx/>
+              <a:buSzTx/>
+              <a:buFontTx/>
+              <a:buNone/>
+              <a:tabLst/>
+            </a:pPr>
+            <a:r>
+              <a:rPr lang="es-MX" altLang="es-MX" sz="1200" dirty="0">
+                <a:solidFill>
+                  <a:srgbClr val="333333"/>
+                </a:solidFill>
+                <a:latin typeface="Helvetica Neue"/>
+              </a:rPr>
+              <a:t>Se observa que:</a:t>
+            </a:r>
+            <a:br>
+              <a:rPr lang="es-MX" altLang="es-MX" sz="1200" dirty="0">
+                <a:solidFill>
+                  <a:srgbClr val="333333"/>
+                </a:solidFill>
+                <a:latin typeface="Helvetica Neue"/>
+              </a:rPr>
+            </a:br>
+            <a:r>
+              <a:rPr lang="es-MX" altLang="es-MX" sz="1200" dirty="0">
+                <a:solidFill>
+                  <a:srgbClr val="333333"/>
+                </a:solidFill>
+                <a:latin typeface="Helvetica Neue"/>
+              </a:rPr>
+              <a:t>Los residuos del modelo MCG1 son muy parecidos con los del MCO3 </a:t>
+            </a:r>
+          </a:p>
+          <a:p>
+            <a:pPr eaLnBrk="1" hangingPunct="1"/>
+            <a:r>
+              <a:rPr lang="es-MX" altLang="es-MX" sz="1200" dirty="0">
+                <a:solidFill>
+                  <a:srgbClr val="333333"/>
+                </a:solidFill>
+                <a:latin typeface="Helvetica Neue"/>
+              </a:rPr>
+              <a:t>Los errores estándar de los coeficientes del modelo MCG1 son muy parecidos con los del MCO3 por lo que quizá el haber considerado una posible correlación de errores en el t-5 no  necesariamente ayudó en mucho al modelo </a:t>
+            </a:r>
+          </a:p>
+        </p:txBody>
+      </p:sp>
+      <p:sp>
+        <p:nvSpPr>
+          <p:cNvPr id="5" name="TextBox 4">
+            <a:extLst>
+              <a:ext uri="{FF2B5EF4-FFF2-40B4-BE49-F238E27FC236}">
+                <a16:creationId xmlns:a16="http://schemas.microsoft.com/office/drawing/2014/main" id="{0761419E-5DBF-F462-3415-5ED39C57466C}"/>
+              </a:ext>
+            </a:extLst>
+          </p:cNvPr>
+          <p:cNvSpPr txBox="1"/>
+          <p:nvPr/>
+        </p:nvSpPr>
+        <p:spPr>
+          <a:xfrm>
+            <a:off x="4214219" y="5811629"/>
+            <a:ext cx="4925370" cy="338554"/>
+          </a:xfrm>
+          <a:prstGeom prst="rect">
+            <a:avLst/>
+          </a:prstGeom>
+          <a:noFill/>
+        </p:spPr>
+        <p:txBody>
+          <a:bodyPr wrap="square">
+            <a:spAutoFit/>
+          </a:bodyPr>
+          <a:lstStyle/>
+          <a:p>
+            <a:pPr algn="l"/>
+            <a:r>
+              <a:rPr lang="es-MX" sz="1600" i="0" dirty="0">
+                <a:solidFill>
+                  <a:srgbClr val="333333"/>
+                </a:solidFill>
+                <a:effectLst/>
+                <a:latin typeface="Helvetica Neue"/>
+              </a:rPr>
+              <a:t>Evaluación general de los error del modelo MCG1</a:t>
+            </a:r>
+          </a:p>
+        </p:txBody>
+      </p:sp>
+      <p:sp>
+        <p:nvSpPr>
+          <p:cNvPr id="6" name="TextBox 5">
+            <a:extLst>
+              <a:ext uri="{FF2B5EF4-FFF2-40B4-BE49-F238E27FC236}">
+                <a16:creationId xmlns:a16="http://schemas.microsoft.com/office/drawing/2014/main" id="{33C61AE2-BF59-960B-9740-FE512F4C57A6}"/>
+              </a:ext>
+            </a:extLst>
+          </p:cNvPr>
+          <p:cNvSpPr txBox="1"/>
+          <p:nvPr/>
+        </p:nvSpPr>
+        <p:spPr>
+          <a:xfrm>
+            <a:off x="201486" y="2326003"/>
+            <a:ext cx="11789028" cy="923330"/>
+          </a:xfrm>
+          <a:prstGeom prst="rect">
+            <a:avLst/>
+          </a:prstGeom>
+          <a:noFill/>
+        </p:spPr>
+        <p:txBody>
+          <a:bodyPr wrap="square">
+            <a:spAutoFit/>
+          </a:bodyPr>
+          <a:lstStyle/>
+          <a:p>
+            <a:pPr algn="ctr"/>
+            <a:r>
+              <a:rPr lang="es-MX" b="1" i="0" u="none" strike="noStrike" dirty="0">
+                <a:solidFill>
+                  <a:srgbClr val="333333"/>
+                </a:solidFill>
+                <a:effectLst/>
+                <a:latin typeface="MathJax_Math-italic"/>
+              </a:rPr>
+              <a:t>log</a:t>
+            </a:r>
+            <a:r>
+              <a:rPr lang="es-MX" b="1" i="0" u="none" strike="noStrike" dirty="0">
+                <a:solidFill>
+                  <a:srgbClr val="333333"/>
+                </a:solidFill>
+                <a:effectLst/>
+                <a:latin typeface="MathJax_Main"/>
+              </a:rPr>
+              <a:t>(</a:t>
+            </a:r>
+            <a:r>
+              <a:rPr lang="es-MX" b="1" i="0" u="none" strike="noStrike" dirty="0" err="1">
+                <a:solidFill>
+                  <a:srgbClr val="333333"/>
+                </a:solidFill>
+                <a:effectLst/>
+                <a:latin typeface="MathJax_Math-italic"/>
+              </a:rPr>
+              <a:t>wagei</a:t>
+            </a:r>
+            <a:r>
+              <a:rPr lang="es-MX" b="1" i="0" u="none" strike="noStrike" dirty="0">
+                <a:solidFill>
+                  <a:srgbClr val="333333"/>
+                </a:solidFill>
+                <a:effectLst/>
+                <a:latin typeface="MathJax_Main"/>
+              </a:rPr>
+              <a:t>)=1.24+0.11∗</a:t>
+            </a:r>
+            <a:r>
+              <a:rPr lang="es-MX" b="1" i="0" u="none" strike="noStrike" dirty="0">
+                <a:solidFill>
+                  <a:srgbClr val="333333"/>
+                </a:solidFill>
+                <a:effectLst/>
+                <a:latin typeface="MathJax_Math-italic"/>
+              </a:rPr>
+              <a:t>educi</a:t>
+            </a:r>
+            <a:r>
+              <a:rPr lang="es-MX" b="1" i="0" u="none" strike="noStrike" dirty="0">
+                <a:solidFill>
+                  <a:srgbClr val="333333"/>
+                </a:solidFill>
+                <a:effectLst/>
+                <a:latin typeface="MathJax_Main"/>
+              </a:rPr>
+              <a:t>+0.008∗</a:t>
+            </a:r>
+            <a:r>
+              <a:rPr lang="es-MX" b="1" i="0" u="none" strike="noStrike" dirty="0">
+                <a:solidFill>
+                  <a:srgbClr val="333333"/>
+                </a:solidFill>
+                <a:effectLst/>
+                <a:latin typeface="MathJax_Math-italic"/>
+              </a:rPr>
+              <a:t>experi</a:t>
+            </a:r>
+            <a:r>
+              <a:rPr lang="es-MX" b="1" i="0" u="none" strike="noStrike" dirty="0">
+                <a:solidFill>
+                  <a:srgbClr val="333333"/>
+                </a:solidFill>
+                <a:effectLst/>
+                <a:latin typeface="MathJax_Main"/>
+              </a:rPr>
+              <a:t>+0.000001∗</a:t>
+            </a:r>
+            <a:r>
+              <a:rPr lang="es-MX" b="1" i="0" u="none" strike="noStrike" dirty="0">
+                <a:solidFill>
+                  <a:srgbClr val="333333"/>
+                </a:solidFill>
+                <a:effectLst/>
+                <a:latin typeface="MathJax_Math-italic"/>
+              </a:rPr>
+              <a:t>faminci</a:t>
+            </a:r>
+            <a:r>
+              <a:rPr lang="es-MX" b="1" i="0" u="none" strike="noStrike" dirty="0">
+                <a:solidFill>
+                  <a:srgbClr val="333333"/>
+                </a:solidFill>
+                <a:effectLst/>
+                <a:latin typeface="MathJax_Main"/>
+              </a:rPr>
+              <a:t>−0.22∗</a:t>
+            </a:r>
+            <a:r>
+              <a:rPr lang="es-MX" b="1" i="0" u="none" strike="noStrike" dirty="0">
+                <a:solidFill>
+                  <a:srgbClr val="333333"/>
+                </a:solidFill>
+                <a:effectLst/>
+                <a:latin typeface="MathJax_Math-italic"/>
+              </a:rPr>
+              <a:t>femalei</a:t>
+            </a:r>
+            <a:r>
+              <a:rPr lang="es-MX" b="1" i="0" u="none" strike="noStrike" dirty="0">
+                <a:solidFill>
+                  <a:srgbClr val="333333"/>
+                </a:solidFill>
+                <a:effectLst/>
+                <a:latin typeface="MathJax_Main"/>
+              </a:rPr>
+              <a:t>+0.14∗</a:t>
+            </a:r>
+            <a:r>
+              <a:rPr lang="es-MX" b="1" i="0" u="none" strike="noStrike" dirty="0">
+                <a:solidFill>
+                  <a:srgbClr val="333333"/>
+                </a:solidFill>
+                <a:effectLst/>
+                <a:latin typeface="MathJax_Math-italic"/>
+              </a:rPr>
+              <a:t>metroi</a:t>
+            </a:r>
+            <a:r>
+              <a:rPr lang="es-MX" b="1" i="0" u="none" strike="noStrike" dirty="0">
+                <a:solidFill>
+                  <a:srgbClr val="333333"/>
+                </a:solidFill>
+                <a:effectLst/>
+                <a:latin typeface="MathJax_Main"/>
+              </a:rPr>
+              <a:t>−0.052∗</a:t>
+            </a:r>
+            <a:r>
+              <a:rPr lang="el-GR" b="1" i="0" u="none" strike="noStrike" dirty="0">
+                <a:solidFill>
+                  <a:srgbClr val="333333"/>
+                </a:solidFill>
+                <a:effectLst/>
+                <a:latin typeface="MathJax_Math-italic"/>
+              </a:rPr>
+              <a:t>θ</a:t>
+            </a:r>
+            <a:r>
+              <a:rPr lang="el-GR" b="1" i="0" u="none" strike="noStrike" dirty="0">
+                <a:solidFill>
+                  <a:srgbClr val="333333"/>
+                </a:solidFill>
+                <a:effectLst/>
+                <a:latin typeface="MathJax_Main"/>
+              </a:rPr>
+              <a:t>1+0.045∗</a:t>
+            </a:r>
+            <a:r>
+              <a:rPr lang="el-GR" b="1" i="0" u="none" strike="noStrike" dirty="0">
+                <a:solidFill>
+                  <a:srgbClr val="333333"/>
+                </a:solidFill>
+                <a:effectLst/>
+                <a:latin typeface="MathJax_Math-italic"/>
+              </a:rPr>
+              <a:t>θ</a:t>
+            </a:r>
+            <a:r>
+              <a:rPr lang="el-GR" b="1" i="0" u="none" strike="noStrike" dirty="0">
+                <a:solidFill>
+                  <a:srgbClr val="333333"/>
+                </a:solidFill>
+                <a:effectLst/>
+                <a:latin typeface="MathJax_Main"/>
+              </a:rPr>
+              <a:t>2+0.032∗</a:t>
+            </a:r>
+            <a:r>
+              <a:rPr lang="el-GR" b="1" i="0" u="none" strike="noStrike" dirty="0">
+                <a:solidFill>
+                  <a:srgbClr val="333333"/>
+                </a:solidFill>
+                <a:effectLst/>
+                <a:latin typeface="MathJax_Math-italic"/>
+              </a:rPr>
+              <a:t>θ</a:t>
+            </a:r>
+            <a:r>
+              <a:rPr lang="el-GR" b="1" i="0" u="none" strike="noStrike" dirty="0">
+                <a:solidFill>
+                  <a:srgbClr val="333333"/>
+                </a:solidFill>
+                <a:effectLst/>
+                <a:latin typeface="MathJax_Main"/>
+              </a:rPr>
+              <a:t>3−0.063∗</a:t>
+            </a:r>
+            <a:r>
+              <a:rPr lang="el-GR" b="1" i="0" u="none" strike="noStrike" dirty="0">
+                <a:solidFill>
+                  <a:srgbClr val="333333"/>
+                </a:solidFill>
+                <a:effectLst/>
+                <a:latin typeface="MathJax_Math-italic"/>
+              </a:rPr>
+              <a:t>θ</a:t>
+            </a:r>
+            <a:r>
+              <a:rPr lang="el-GR" b="1" i="0" u="none" strike="noStrike" dirty="0">
+                <a:solidFill>
+                  <a:srgbClr val="333333"/>
+                </a:solidFill>
+                <a:effectLst/>
+                <a:latin typeface="MathJax_Main"/>
+              </a:rPr>
+              <a:t>4−0.068∗</a:t>
+            </a:r>
+            <a:r>
+              <a:rPr lang="el-GR" b="1" i="0" u="none" strike="noStrike" dirty="0">
+                <a:solidFill>
+                  <a:srgbClr val="333333"/>
+                </a:solidFill>
+                <a:effectLst/>
+                <a:latin typeface="MathJax_Math-italic"/>
+              </a:rPr>
+              <a:t>θ</a:t>
+            </a:r>
+            <a:r>
+              <a:rPr lang="el-GR" b="1" i="0" u="none" strike="noStrike" dirty="0">
+                <a:solidFill>
+                  <a:srgbClr val="333333"/>
+                </a:solidFill>
+                <a:effectLst/>
+                <a:latin typeface="MathJax_Main"/>
+              </a:rPr>
+              <a:t>5+</a:t>
+            </a:r>
+            <a:r>
+              <a:rPr lang="el-GR" b="1" i="0" u="none" strike="noStrike" dirty="0">
+                <a:solidFill>
+                  <a:srgbClr val="333333"/>
+                </a:solidFill>
+                <a:effectLst/>
+                <a:latin typeface="MathJax_Math-italic"/>
+              </a:rPr>
+              <a:t>ε</a:t>
+            </a:r>
+            <a:r>
+              <a:rPr lang="es-MX" b="1" i="0" u="none" strike="noStrike" dirty="0">
+                <a:solidFill>
+                  <a:srgbClr val="333333"/>
+                </a:solidFill>
+                <a:effectLst/>
+                <a:latin typeface="MathJax_Math-italic"/>
+              </a:rPr>
+              <a:t>i</a:t>
+            </a:r>
+            <a:br>
+              <a:rPr lang="es-MX" b="1" dirty="0"/>
+            </a:br>
+            <a:endParaRPr lang="es-MX" b="1" dirty="0"/>
+          </a:p>
+        </p:txBody>
+      </p:sp>
+      <p:pic>
+        <p:nvPicPr>
+          <p:cNvPr id="11" name="Picture 10">
+            <a:extLst>
+              <a:ext uri="{FF2B5EF4-FFF2-40B4-BE49-F238E27FC236}">
+                <a16:creationId xmlns:a16="http://schemas.microsoft.com/office/drawing/2014/main" id="{4A91DC93-DEE6-0549-189C-90654BD2F038}"/>
+              </a:ext>
+            </a:extLst>
+          </p:cNvPr>
+          <p:cNvPicPr>
+            <a:picLocks noChangeAspect="1"/>
+          </p:cNvPicPr>
+          <p:nvPr/>
+        </p:nvPicPr>
+        <p:blipFill rotWithShape="1">
+          <a:blip r:embed="rId3"/>
+          <a:srcRect t="1320"/>
+          <a:stretch/>
+        </p:blipFill>
+        <p:spPr>
+          <a:xfrm>
+            <a:off x="463466" y="2776899"/>
+            <a:ext cx="3600533" cy="3493519"/>
+          </a:xfrm>
+          <a:prstGeom prst="rect">
+            <a:avLst/>
+          </a:prstGeom>
+        </p:spPr>
+      </p:pic>
+      <p:pic>
+        <p:nvPicPr>
+          <p:cNvPr id="19" name="Picture 18">
+            <a:extLst>
+              <a:ext uri="{FF2B5EF4-FFF2-40B4-BE49-F238E27FC236}">
+                <a16:creationId xmlns:a16="http://schemas.microsoft.com/office/drawing/2014/main" id="{40FF59B6-88F0-D7B8-6F76-C1E345DDF376}"/>
+              </a:ext>
+            </a:extLst>
+          </p:cNvPr>
+          <p:cNvPicPr>
+            <a:picLocks noChangeAspect="1"/>
+          </p:cNvPicPr>
+          <p:nvPr/>
+        </p:nvPicPr>
+        <p:blipFill>
+          <a:blip r:embed="rId4"/>
+          <a:stretch>
+            <a:fillRect/>
+          </a:stretch>
+        </p:blipFill>
+        <p:spPr>
+          <a:xfrm>
+            <a:off x="4622464" y="3164759"/>
+            <a:ext cx="3888048" cy="2399480"/>
+          </a:xfrm>
+          <a:prstGeom prst="rect">
+            <a:avLst/>
+          </a:prstGeom>
+        </p:spPr>
+      </p:pic>
+    </p:spTree>
+    <p:extLst>
+      <p:ext uri="{BB962C8B-B14F-4D97-AF65-F5344CB8AC3E}">
+        <p14:creationId xmlns:p14="http://schemas.microsoft.com/office/powerpoint/2010/main" val="2256576929"/>
+      </p:ext>
+    </p:extLst>
+  </p:cSld>
+  <p:clrMapOvr>
+    <a:masterClrMapping/>
+  </p:clrMapOvr>
+</p:sld>
+</file>
+
+<file path=ppt/slides/slide16.xml><?xml version="1.0" encoding="utf-8"?>
+<p:sld xmlns:a="http://schemas.openxmlformats.org/drawingml/2006/main" xmlns:r="http://schemas.openxmlformats.org/officeDocument/2006/relationships" xmlns:p="http://schemas.openxmlformats.org/presentationml/2006/main">
+  <p:cSld>
+    <p:spTree>
+      <p:nvGrpSpPr>
+        <p:cNvPr id="1" name=""/>
+        <p:cNvGrpSpPr/>
+        <p:nvPr/>
+      </p:nvGrpSpPr>
+      <p:grpSpPr>
+        <a:xfrm>
+          <a:off x="0" y="0"/>
+          <a:ext cx="0" cy="0"/>
+          <a:chOff x="0" y="0"/>
+          <a:chExt cx="0" cy="0"/>
+        </a:xfrm>
+      </p:grpSpPr>
+      <p:sp>
+        <p:nvSpPr>
+          <p:cNvPr id="4" name="Title 2">
+            <a:extLst>
+              <a:ext uri="{FF2B5EF4-FFF2-40B4-BE49-F238E27FC236}">
+                <a16:creationId xmlns:a16="http://schemas.microsoft.com/office/drawing/2014/main" id="{D46A2E87-6FFB-3D1F-1681-9C49DDC7D4FF}"/>
+              </a:ext>
+            </a:extLst>
+          </p:cNvPr>
+          <p:cNvSpPr txBox="1">
+            <a:spLocks/>
+          </p:cNvSpPr>
+          <p:nvPr/>
+        </p:nvSpPr>
+        <p:spPr>
+          <a:xfrm>
+            <a:off x="510558" y="196996"/>
+            <a:ext cx="11681442" cy="594360"/>
+          </a:xfrm>
+          <a:prstGeom prst="rect">
+            <a:avLst/>
+          </a:prstGeom>
+        </p:spPr>
+        <p:txBody>
+          <a:bodyPr/>
+          <a:lstStyle>
+            <a:lvl1pPr algn="l" defTabSz="914400" rtl="0" eaLnBrk="1" latinLnBrk="0" hangingPunct="1">
+              <a:lnSpc>
+                <a:spcPct val="85000"/>
+              </a:lnSpc>
+              <a:spcBef>
+                <a:spcPct val="0"/>
+              </a:spcBef>
+              <a:buNone/>
+              <a:defRPr sz="4800" kern="1200" spc="-50" baseline="0">
+                <a:solidFill>
+                  <a:schemeClr val="tx1">
+                    <a:lumMod val="75000"/>
+                    <a:lumOff val="25000"/>
+                  </a:schemeClr>
+                </a:solidFill>
+                <a:latin typeface="+mj-lt"/>
+                <a:ea typeface="+mj-ea"/>
+                <a:cs typeface="+mj-cs"/>
+              </a:defRPr>
+            </a:lvl1pPr>
+          </a:lstStyle>
+          <a:p>
+            <a:r>
+              <a:rPr lang="es-ES" sz="3200" b="1" dirty="0">
+                <a:solidFill>
+                  <a:schemeClr val="accent1"/>
+                </a:solidFill>
+              </a:rPr>
+              <a:t>La matriz de covarianza de errores en el modelo de MCG </a:t>
+            </a:r>
+            <a:endParaRPr lang="es-MX" sz="3200" dirty="0">
+              <a:solidFill>
+                <a:schemeClr val="accent1"/>
+              </a:solidFill>
+            </a:endParaRPr>
+          </a:p>
+        </p:txBody>
+      </p:sp>
+      <p:pic>
+        <p:nvPicPr>
+          <p:cNvPr id="6" name="Picture 5">
+            <a:extLst>
+              <a:ext uri="{FF2B5EF4-FFF2-40B4-BE49-F238E27FC236}">
+                <a16:creationId xmlns:a16="http://schemas.microsoft.com/office/drawing/2014/main" id="{11EBFA52-A745-0A5D-606E-00196351DD83}"/>
+              </a:ext>
+            </a:extLst>
+          </p:cNvPr>
+          <p:cNvPicPr>
+            <a:picLocks noChangeAspect="1"/>
+          </p:cNvPicPr>
+          <p:nvPr/>
+        </p:nvPicPr>
+        <p:blipFill>
+          <a:blip r:embed="rId3"/>
+          <a:stretch>
+            <a:fillRect/>
+          </a:stretch>
+        </p:blipFill>
+        <p:spPr>
+          <a:xfrm>
+            <a:off x="510558" y="1008467"/>
+            <a:ext cx="5585442" cy="2534833"/>
+          </a:xfrm>
+          <a:prstGeom prst="rect">
+            <a:avLst/>
+          </a:prstGeom>
+        </p:spPr>
+      </p:pic>
+      <p:pic>
+        <p:nvPicPr>
+          <p:cNvPr id="9" name="Picture 8">
+            <a:extLst>
+              <a:ext uri="{FF2B5EF4-FFF2-40B4-BE49-F238E27FC236}">
+                <a16:creationId xmlns:a16="http://schemas.microsoft.com/office/drawing/2014/main" id="{54B10F76-AF20-BE3B-3B87-854D91C7226F}"/>
+              </a:ext>
+            </a:extLst>
+          </p:cNvPr>
+          <p:cNvPicPr>
+            <a:picLocks noChangeAspect="1"/>
+          </p:cNvPicPr>
+          <p:nvPr/>
+        </p:nvPicPr>
+        <p:blipFill>
+          <a:blip r:embed="rId4"/>
+          <a:stretch>
+            <a:fillRect/>
+          </a:stretch>
+        </p:blipFill>
+        <p:spPr>
+          <a:xfrm>
+            <a:off x="6625067" y="1008467"/>
+            <a:ext cx="5342666" cy="2534833"/>
+          </a:xfrm>
+          <a:prstGeom prst="rect">
+            <a:avLst/>
+          </a:prstGeom>
+        </p:spPr>
+      </p:pic>
+      <p:pic>
+        <p:nvPicPr>
+          <p:cNvPr id="12" name="Picture 11">
+            <a:extLst>
+              <a:ext uri="{FF2B5EF4-FFF2-40B4-BE49-F238E27FC236}">
+                <a16:creationId xmlns:a16="http://schemas.microsoft.com/office/drawing/2014/main" id="{FD74A977-C318-CC15-C539-B92795810D33}"/>
+              </a:ext>
+            </a:extLst>
+          </p:cNvPr>
+          <p:cNvPicPr>
+            <a:picLocks noChangeAspect="1"/>
+          </p:cNvPicPr>
+          <p:nvPr/>
+        </p:nvPicPr>
+        <p:blipFill>
+          <a:blip r:embed="rId5"/>
+          <a:stretch>
+            <a:fillRect/>
+          </a:stretch>
+        </p:blipFill>
+        <p:spPr>
+          <a:xfrm>
+            <a:off x="3443360" y="3875431"/>
+            <a:ext cx="6237849" cy="2286863"/>
+          </a:xfrm>
+          <a:prstGeom prst="rect">
+            <a:avLst/>
+          </a:prstGeom>
+        </p:spPr>
+      </p:pic>
+    </p:spTree>
+    <p:extLst>
+      <p:ext uri="{BB962C8B-B14F-4D97-AF65-F5344CB8AC3E}">
+        <p14:creationId xmlns:p14="http://schemas.microsoft.com/office/powerpoint/2010/main" val="3173748898"/>
+      </p:ext>
+    </p:extLst>
+  </p:cSld>
+  <p:clrMapOvr>
+    <a:masterClrMapping/>
+  </p:clrMapOvr>
+</p:sld>
+</file>
+
+<file path=ppt/slides/slide17.xml><?xml version="1.0" encoding="utf-8"?>
+<p:sld xmlns:a="http://schemas.openxmlformats.org/drawingml/2006/main" xmlns:r="http://schemas.openxmlformats.org/officeDocument/2006/relationships" xmlns:p="http://schemas.openxmlformats.org/presentationml/2006/main">
+  <p:cSld>
+    <p:spTree>
+      <p:nvGrpSpPr>
+        <p:cNvPr id="1" name=""/>
+        <p:cNvGrpSpPr/>
+        <p:nvPr/>
+      </p:nvGrpSpPr>
+      <p:grpSpPr>
+        <a:xfrm>
+          <a:off x="0" y="0"/>
+          <a:ext cx="0" cy="0"/>
+          <a:chOff x="0" y="0"/>
+          <a:chExt cx="0" cy="0"/>
+        </a:xfrm>
+      </p:grpSpPr>
+      <p:sp>
+        <p:nvSpPr>
+          <p:cNvPr id="4" name="Title 2">
+            <a:extLst>
+              <a:ext uri="{FF2B5EF4-FFF2-40B4-BE49-F238E27FC236}">
+                <a16:creationId xmlns:a16="http://schemas.microsoft.com/office/drawing/2014/main" id="{D46A2E87-6FFB-3D1F-1681-9C49DDC7D4FF}"/>
+              </a:ext>
+            </a:extLst>
+          </p:cNvPr>
+          <p:cNvSpPr txBox="1">
+            <a:spLocks/>
+          </p:cNvSpPr>
+          <p:nvPr/>
+        </p:nvSpPr>
+        <p:spPr>
+          <a:xfrm>
+            <a:off x="510558" y="196996"/>
+            <a:ext cx="11205192" cy="594360"/>
+          </a:xfrm>
+          <a:prstGeom prst="rect">
+            <a:avLst/>
+          </a:prstGeom>
+        </p:spPr>
+        <p:txBody>
+          <a:bodyPr/>
+          <a:lstStyle>
+            <a:lvl1pPr algn="l" defTabSz="914400" rtl="0" eaLnBrk="1" latinLnBrk="0" hangingPunct="1">
+              <a:lnSpc>
+                <a:spcPct val="85000"/>
+              </a:lnSpc>
+              <a:spcBef>
+                <a:spcPct val="0"/>
+              </a:spcBef>
+              <a:buNone/>
+              <a:defRPr sz="4800" kern="1200" spc="-50" baseline="0">
+                <a:solidFill>
+                  <a:schemeClr val="tx1">
+                    <a:lumMod val="75000"/>
+                    <a:lumOff val="25000"/>
+                  </a:schemeClr>
+                </a:solidFill>
+                <a:latin typeface="+mj-lt"/>
+                <a:ea typeface="+mj-ea"/>
+                <a:cs typeface="+mj-cs"/>
+              </a:defRPr>
+            </a:lvl1pPr>
+          </a:lstStyle>
+          <a:p>
+            <a:r>
+              <a:rPr lang="en-US" sz="3200" b="1" dirty="0" err="1">
+                <a:solidFill>
+                  <a:schemeClr val="accent1"/>
+                </a:solidFill>
+              </a:rPr>
+              <a:t>Aplicación</a:t>
+            </a:r>
+            <a:r>
+              <a:rPr lang="en-US" sz="3200" b="1" dirty="0">
+                <a:solidFill>
+                  <a:schemeClr val="accent1"/>
+                </a:solidFill>
+              </a:rPr>
+              <a:t> del </a:t>
+            </a:r>
+            <a:r>
+              <a:rPr lang="en-US" sz="3200" b="1" dirty="0" err="1">
+                <a:solidFill>
+                  <a:schemeClr val="accent1"/>
+                </a:solidFill>
+              </a:rPr>
+              <a:t>modelo</a:t>
+            </a:r>
+            <a:r>
+              <a:rPr lang="en-US" sz="3200" b="1" dirty="0">
+                <a:solidFill>
+                  <a:schemeClr val="accent1"/>
+                </a:solidFill>
+              </a:rPr>
+              <a:t> de </a:t>
+            </a:r>
+            <a:r>
+              <a:rPr lang="en-US" sz="3200" b="1" dirty="0" err="1">
+                <a:solidFill>
+                  <a:schemeClr val="accent1"/>
+                </a:solidFill>
+              </a:rPr>
+              <a:t>Mínimos</a:t>
+            </a:r>
+            <a:r>
+              <a:rPr lang="en-US" sz="3200" b="1" dirty="0">
+                <a:solidFill>
+                  <a:schemeClr val="accent1"/>
+                </a:solidFill>
+              </a:rPr>
+              <a:t> </a:t>
+            </a:r>
+            <a:r>
+              <a:rPr lang="en-US" sz="3200" b="1" dirty="0" err="1">
+                <a:solidFill>
+                  <a:schemeClr val="accent1"/>
+                </a:solidFill>
+              </a:rPr>
+              <a:t>Cuadrados</a:t>
+            </a:r>
+            <a:r>
+              <a:rPr lang="en-US" sz="3200" b="1" dirty="0">
+                <a:solidFill>
+                  <a:schemeClr val="accent1"/>
+                </a:solidFill>
+              </a:rPr>
+              <a:t> </a:t>
+            </a:r>
+            <a:r>
+              <a:rPr lang="en-US" sz="3200" b="1" dirty="0" err="1">
+                <a:solidFill>
+                  <a:schemeClr val="accent1"/>
+                </a:solidFill>
+              </a:rPr>
+              <a:t>Generalizados</a:t>
+            </a:r>
+            <a:r>
+              <a:rPr lang="en-US" sz="3200" b="1" dirty="0">
+                <a:solidFill>
+                  <a:schemeClr val="accent1"/>
+                </a:solidFill>
+              </a:rPr>
+              <a:t> (MCG2)</a:t>
+            </a:r>
+            <a:endParaRPr lang="es-MX" sz="3200" b="1" dirty="0">
+              <a:solidFill>
+                <a:schemeClr val="accent1"/>
+              </a:solidFill>
+            </a:endParaRPr>
+          </a:p>
+        </p:txBody>
+      </p:sp>
+      <p:sp>
+        <p:nvSpPr>
+          <p:cNvPr id="3" name="TextBox 2">
+            <a:extLst>
+              <a:ext uri="{FF2B5EF4-FFF2-40B4-BE49-F238E27FC236}">
+                <a16:creationId xmlns:a16="http://schemas.microsoft.com/office/drawing/2014/main" id="{5E532800-B3ED-4623-23DE-9E6F29C42DA1}"/>
+              </a:ext>
+            </a:extLst>
+          </p:cNvPr>
+          <p:cNvSpPr txBox="1"/>
+          <p:nvPr/>
+        </p:nvSpPr>
+        <p:spPr>
+          <a:xfrm>
+            <a:off x="0" y="617927"/>
+            <a:ext cx="12192000" cy="369332"/>
+          </a:xfrm>
+          <a:prstGeom prst="rect">
+            <a:avLst/>
+          </a:prstGeom>
+          <a:noFill/>
+        </p:spPr>
+        <p:txBody>
+          <a:bodyPr wrap="square">
+            <a:spAutoFit/>
+          </a:bodyPr>
+          <a:lstStyle/>
+          <a:p>
+            <a:r>
+              <a:rPr lang="es-ES" sz="1800" b="0" i="0" u="none" strike="noStrike" kern="1200" dirty="0">
+                <a:solidFill>
+                  <a:schemeClr val="dk1"/>
+                </a:solidFill>
+                <a:effectLst/>
+                <a:latin typeface="+mn-lt"/>
+                <a:ea typeface="+mn-ea"/>
+                <a:cs typeface="+mn-cs"/>
+              </a:rPr>
+              <a:t>Se decidió correr un nuevo modelo de MCG2 </a:t>
+            </a:r>
+            <a:r>
+              <a:rPr lang="es-ES" sz="1800" b="0" i="0" u="none" strike="noStrike" kern="1200" dirty="0" err="1">
+                <a:solidFill>
+                  <a:schemeClr val="dk1"/>
+                </a:solidFill>
+                <a:effectLst/>
+                <a:latin typeface="+mn-lt"/>
+                <a:ea typeface="+mn-ea"/>
+                <a:cs typeface="+mn-cs"/>
+              </a:rPr>
+              <a:t>intentaod</a:t>
+            </a:r>
+            <a:r>
+              <a:rPr lang="es-ES" sz="1800" b="0" i="0" u="none" strike="noStrike" kern="1200" dirty="0">
+                <a:solidFill>
+                  <a:schemeClr val="dk1"/>
+                </a:solidFill>
+                <a:effectLst/>
+                <a:latin typeface="+mn-lt"/>
+                <a:ea typeface="+mn-ea"/>
+                <a:cs typeface="+mn-cs"/>
+              </a:rPr>
+              <a:t> abordar además la heterocedasticidad en los errores </a:t>
+            </a:r>
+            <a:endParaRPr lang="es-MX" sz="1800" dirty="0"/>
+          </a:p>
+        </p:txBody>
+      </p:sp>
+      <p:sp>
+        <p:nvSpPr>
+          <p:cNvPr id="2" name="Rectangle 1">
+            <a:extLst>
+              <a:ext uri="{FF2B5EF4-FFF2-40B4-BE49-F238E27FC236}">
+                <a16:creationId xmlns:a16="http://schemas.microsoft.com/office/drawing/2014/main" id="{7353D332-B2E6-A989-E2C5-F1FAEB42CBC4}"/>
+              </a:ext>
+            </a:extLst>
+          </p:cNvPr>
+          <p:cNvSpPr>
+            <a:spLocks noChangeArrowheads="1"/>
+          </p:cNvSpPr>
+          <p:nvPr/>
+        </p:nvSpPr>
+        <p:spPr bwMode="auto">
+          <a:xfrm>
+            <a:off x="670560" y="1022146"/>
+            <a:ext cx="10228562" cy="1158096"/>
+          </a:xfrm>
+          <a:prstGeom prst="rect">
+            <a:avLst/>
+          </a:prstGeom>
+          <a:solidFill>
+            <a:srgbClr val="F5F5F5"/>
+          </a:solidFill>
+          <a:ln>
+            <a:noFill/>
+          </a:ln>
+          <a:effectLst/>
+          <a:extLst>
+            <a:ext uri="{91240B29-F687-4F45-9708-019B960494DF}">
+              <a14:hiddenLine xmlns:a14="http://schemas.microsoft.com/office/drawing/2010/main" w="9525">
+                <a:solidFill>
+                  <a:schemeClr val="tx1"/>
+                </a:solidFill>
+                <a:miter lim="800000"/>
+                <a:headEnd/>
+                <a:tailEnd/>
+              </a14:hiddenLine>
+            </a:ext>
+            <a:ext uri="{AF507438-7753-43E0-B8FC-AC1667EBCBE1}">
+              <a14:hiddenEffects xmlns:a14="http://schemas.microsoft.com/office/drawing/2010/main">
+                <a:effectLst>
+                  <a:outerShdw dist="35921" dir="2700000" algn="ctr" rotWithShape="0">
+                    <a:schemeClr val="bg2"/>
+                  </a:outerShdw>
+                </a:effectLst>
+              </a14:hiddenEffects>
+            </a:ext>
+          </a:extLst>
+        </p:spPr>
+        <p:txBody>
+          <a:bodyPr vert="horz" wrap="square" lIns="0" tIns="0" rIns="0" bIns="63480" numCol="1" anchor="ctr" anchorCtr="0" compatLnSpc="1">
+            <a:prstTxWarp prst="textNoShape">
+              <a:avLst/>
+            </a:prstTxWarp>
+            <a:spAutoFit/>
+          </a:bodyPr>
+          <a:lstStyle/>
+          <a:p>
+            <a:pPr eaLnBrk="0" fontAlgn="base" hangingPunct="0">
+              <a:spcBef>
+                <a:spcPct val="0"/>
+              </a:spcBef>
+              <a:spcAft>
+                <a:spcPct val="0"/>
+              </a:spcAft>
+            </a:pPr>
+            <a:endParaRPr lang="es-MX" altLang="es-MX" sz="1200" dirty="0">
+              <a:solidFill>
+                <a:srgbClr val="333333"/>
+              </a:solidFill>
+            </a:endParaRPr>
+          </a:p>
+          <a:p>
+            <a:pPr eaLnBrk="0" fontAlgn="base" hangingPunct="0">
+              <a:spcBef>
+                <a:spcPct val="0"/>
+              </a:spcBef>
+              <a:spcAft>
+                <a:spcPct val="0"/>
+              </a:spcAft>
+            </a:pPr>
+            <a:r>
+              <a:rPr lang="es-MX" altLang="es-MX" sz="1200" dirty="0">
+                <a:solidFill>
+                  <a:srgbClr val="333333"/>
+                </a:solidFill>
+              </a:rPr>
+              <a:t>glm_2_2_wage_train_data &lt;- </a:t>
+            </a:r>
+            <a:r>
+              <a:rPr lang="es-MX" altLang="es-MX" sz="1200" dirty="0" err="1">
+                <a:solidFill>
+                  <a:srgbClr val="333333"/>
+                </a:solidFill>
+              </a:rPr>
+              <a:t>gls</a:t>
+            </a:r>
+            <a:r>
+              <a:rPr lang="es-MX" altLang="es-MX" sz="1200" dirty="0">
+                <a:solidFill>
+                  <a:srgbClr val="333333"/>
+                </a:solidFill>
+              </a:rPr>
+              <a:t>(log(</a:t>
+            </a:r>
+            <a:r>
+              <a:rPr lang="es-MX" altLang="es-MX" sz="1200" dirty="0" err="1">
+                <a:solidFill>
+                  <a:srgbClr val="333333"/>
+                </a:solidFill>
+              </a:rPr>
+              <a:t>fitted</a:t>
+            </a:r>
+            <a:r>
+              <a:rPr lang="es-MX" altLang="es-MX" sz="1200" dirty="0">
+                <a:solidFill>
+                  <a:srgbClr val="333333"/>
+                </a:solidFill>
+              </a:rPr>
+              <a:t>) ~ </a:t>
+            </a:r>
+            <a:r>
+              <a:rPr lang="es-MX" altLang="es-MX" sz="1200" dirty="0" err="1">
+                <a:solidFill>
+                  <a:srgbClr val="333333"/>
+                </a:solidFill>
+              </a:rPr>
+              <a:t>educ</a:t>
+            </a:r>
+            <a:r>
+              <a:rPr lang="es-MX" altLang="es-MX" sz="1200" dirty="0">
+                <a:solidFill>
+                  <a:srgbClr val="333333"/>
+                </a:solidFill>
+              </a:rPr>
+              <a:t> + </a:t>
+            </a:r>
+            <a:r>
+              <a:rPr lang="es-MX" altLang="es-MX" sz="1200" dirty="0" err="1">
+                <a:solidFill>
+                  <a:srgbClr val="333333"/>
+                </a:solidFill>
+              </a:rPr>
+              <a:t>exper</a:t>
+            </a:r>
+            <a:r>
+              <a:rPr lang="es-MX" altLang="es-MX" sz="1200" dirty="0">
+                <a:solidFill>
+                  <a:srgbClr val="333333"/>
+                </a:solidFill>
+              </a:rPr>
+              <a:t> + </a:t>
+            </a:r>
+            <a:r>
+              <a:rPr lang="es-MX" altLang="es-MX" sz="1200" dirty="0" err="1">
+                <a:solidFill>
+                  <a:srgbClr val="333333"/>
+                </a:solidFill>
+              </a:rPr>
+              <a:t>faminc</a:t>
+            </a:r>
+            <a:r>
+              <a:rPr lang="es-MX" altLang="es-MX" sz="1200" dirty="0">
+                <a:solidFill>
+                  <a:srgbClr val="333333"/>
+                </a:solidFill>
+              </a:rPr>
+              <a:t> + </a:t>
+            </a:r>
+            <a:r>
+              <a:rPr lang="es-MX" altLang="es-MX" sz="1200" dirty="0" err="1">
+                <a:solidFill>
+                  <a:srgbClr val="333333"/>
+                </a:solidFill>
+              </a:rPr>
+              <a:t>female</a:t>
+            </a:r>
+            <a:r>
+              <a:rPr lang="es-MX" altLang="es-MX" sz="1200" dirty="0">
+                <a:solidFill>
+                  <a:srgbClr val="333333"/>
+                </a:solidFill>
+              </a:rPr>
+              <a:t> + metro, </a:t>
+            </a:r>
+          </a:p>
+          <a:p>
+            <a:pPr eaLnBrk="0" fontAlgn="base" hangingPunct="0">
+              <a:spcBef>
+                <a:spcPct val="0"/>
+              </a:spcBef>
+              <a:spcAft>
+                <a:spcPct val="0"/>
+              </a:spcAft>
+            </a:pPr>
+            <a:r>
+              <a:rPr lang="es-MX" altLang="es-MX" sz="1200" dirty="0">
+                <a:solidFill>
+                  <a:srgbClr val="333333"/>
+                </a:solidFill>
+              </a:rPr>
+              <a:t>                                </a:t>
+            </a:r>
+            <a:r>
+              <a:rPr lang="es-MX" altLang="es-MX" sz="1200" dirty="0" err="1">
+                <a:solidFill>
+                  <a:srgbClr val="333333"/>
+                </a:solidFill>
+              </a:rPr>
+              <a:t>weights</a:t>
+            </a:r>
+            <a:r>
+              <a:rPr lang="es-MX" altLang="es-MX" sz="1200" dirty="0">
+                <a:solidFill>
+                  <a:srgbClr val="333333"/>
+                </a:solidFill>
+              </a:rPr>
+              <a:t> = </a:t>
+            </a:r>
+            <a:r>
+              <a:rPr lang="es-MX" altLang="es-MX" sz="1200" dirty="0" err="1">
+                <a:solidFill>
+                  <a:srgbClr val="333333"/>
+                </a:solidFill>
+              </a:rPr>
+              <a:t>weights_varFunc</a:t>
+            </a:r>
+            <a:r>
+              <a:rPr lang="es-MX" altLang="es-MX" sz="1200" dirty="0">
+                <a:solidFill>
+                  <a:srgbClr val="333333"/>
+                </a:solidFill>
+              </a:rPr>
+              <a:t>,</a:t>
+            </a:r>
+          </a:p>
+          <a:p>
+            <a:pPr eaLnBrk="0" fontAlgn="base" hangingPunct="0">
+              <a:spcBef>
+                <a:spcPct val="0"/>
+              </a:spcBef>
+              <a:spcAft>
+                <a:spcPct val="0"/>
+              </a:spcAft>
+            </a:pPr>
+            <a:r>
+              <a:rPr lang="es-MX" altLang="es-MX" sz="1200" dirty="0">
+                <a:solidFill>
+                  <a:srgbClr val="333333"/>
+                </a:solidFill>
+              </a:rPr>
+              <a:t>                                </a:t>
+            </a:r>
+            <a:r>
+              <a:rPr lang="es-MX" altLang="es-MX" sz="1200" dirty="0" err="1">
+                <a:solidFill>
+                  <a:srgbClr val="333333"/>
+                </a:solidFill>
+              </a:rPr>
+              <a:t>corARMA</a:t>
+            </a:r>
+            <a:r>
+              <a:rPr lang="es-MX" altLang="es-MX" sz="1200" dirty="0">
+                <a:solidFill>
+                  <a:srgbClr val="333333"/>
+                </a:solidFill>
+              </a:rPr>
+              <a:t>(p = 5),</a:t>
+            </a:r>
+          </a:p>
+          <a:p>
+            <a:pPr eaLnBrk="0" fontAlgn="base" hangingPunct="0">
+              <a:spcBef>
+                <a:spcPct val="0"/>
+              </a:spcBef>
+              <a:spcAft>
+                <a:spcPct val="0"/>
+              </a:spcAft>
+            </a:pPr>
+            <a:r>
+              <a:rPr lang="es-MX" altLang="es-MX" sz="1200" dirty="0">
+                <a:solidFill>
+                  <a:srgbClr val="333333"/>
+                </a:solidFill>
+              </a:rPr>
+              <a:t>                                </a:t>
+            </a:r>
+            <a:r>
+              <a:rPr lang="es-MX" altLang="es-MX" sz="1200" dirty="0" err="1">
+                <a:solidFill>
+                  <a:srgbClr val="333333"/>
+                </a:solidFill>
+              </a:rPr>
+              <a:t>method</a:t>
+            </a:r>
+            <a:r>
+              <a:rPr lang="es-MX" altLang="es-MX" sz="1200" dirty="0">
+                <a:solidFill>
+                  <a:srgbClr val="333333"/>
+                </a:solidFill>
+              </a:rPr>
+              <a:t> = "ML", </a:t>
+            </a:r>
+          </a:p>
+          <a:p>
+            <a:pPr eaLnBrk="0" fontAlgn="base" hangingPunct="0">
+              <a:spcBef>
+                <a:spcPct val="0"/>
+              </a:spcBef>
+              <a:spcAft>
+                <a:spcPct val="0"/>
+              </a:spcAft>
+            </a:pPr>
+            <a:r>
+              <a:rPr lang="es-MX" altLang="es-MX" sz="1200" dirty="0">
+                <a:solidFill>
+                  <a:srgbClr val="333333"/>
+                </a:solidFill>
+              </a:rPr>
+              <a:t>                                data = data_weighted_glm_1_wage_train_data)</a:t>
+            </a:r>
+          </a:p>
+          <a:p>
+            <a:pPr eaLnBrk="0" fontAlgn="base" hangingPunct="0">
+              <a:spcBef>
+                <a:spcPct val="0"/>
+              </a:spcBef>
+              <a:spcAft>
+                <a:spcPct val="0"/>
+              </a:spcAft>
+            </a:pPr>
+            <a:endParaRPr lang="es-MX" altLang="es-MX" sz="1200" dirty="0">
+              <a:solidFill>
+                <a:srgbClr val="333333"/>
+              </a:solidFill>
+            </a:endParaRPr>
+          </a:p>
+          <a:p>
+            <a:pPr eaLnBrk="0" fontAlgn="base" hangingPunct="0">
+              <a:spcBef>
+                <a:spcPct val="0"/>
+              </a:spcBef>
+              <a:spcAft>
+                <a:spcPct val="0"/>
+              </a:spcAft>
+            </a:pPr>
+            <a:r>
+              <a:rPr lang="es-MX" altLang="es-MX" sz="1200" dirty="0" err="1">
+                <a:solidFill>
+                  <a:srgbClr val="333333"/>
+                </a:solidFill>
+              </a:rPr>
+              <a:t>summary</a:t>
+            </a:r>
+            <a:r>
+              <a:rPr lang="es-MX" altLang="es-MX" sz="1200" dirty="0">
+                <a:solidFill>
+                  <a:srgbClr val="333333"/>
+                </a:solidFill>
+              </a:rPr>
+              <a:t>(glm_2_2_wage_train_data)</a:t>
+            </a:r>
+          </a:p>
+        </p:txBody>
+      </p:sp>
+      <p:sp>
+        <p:nvSpPr>
+          <p:cNvPr id="13" name="Rectangle 3">
+            <a:extLst>
+              <a:ext uri="{FF2B5EF4-FFF2-40B4-BE49-F238E27FC236}">
+                <a16:creationId xmlns:a16="http://schemas.microsoft.com/office/drawing/2014/main" id="{7B53B837-C20D-A715-5D9D-70C9FC0DF7BA}"/>
+              </a:ext>
+            </a:extLst>
+          </p:cNvPr>
+          <p:cNvSpPr>
+            <a:spLocks noChangeArrowheads="1"/>
+          </p:cNvSpPr>
+          <p:nvPr/>
+        </p:nvSpPr>
+        <p:spPr bwMode="auto">
+          <a:xfrm>
+            <a:off x="9475387" y="3186398"/>
+            <a:ext cx="2515127" cy="1910759"/>
+          </a:xfrm>
+          <a:prstGeom prst="rect">
+            <a:avLst/>
+          </a:prstGeom>
+          <a:solidFill>
+            <a:srgbClr val="FFFFFF"/>
+          </a:solidFill>
+          <a:ln>
+            <a:noFill/>
+          </a:ln>
+          <a:effectLst/>
+          <a:extLst>
+            <a:ext uri="{91240B29-F687-4F45-9708-019B960494DF}">
+              <a14:hiddenLine xmlns:a14="http://schemas.microsoft.com/office/drawing/2010/main" w="9525">
+                <a:solidFill>
+                  <a:schemeClr val="tx1"/>
+                </a:solidFill>
+                <a:miter lim="800000"/>
+                <a:headEnd/>
+                <a:tailEnd/>
+              </a14:hiddenLine>
+            </a:ext>
+            <a:ext uri="{AF507438-7753-43E0-B8FC-AC1667EBCBE1}">
+              <a14:hiddenEffects xmlns:a14="http://schemas.microsoft.com/office/drawing/2010/main">
+                <a:effectLst>
+                  <a:outerShdw dist="35921" dir="2700000" algn="ctr" rotWithShape="0">
+                    <a:schemeClr val="bg2"/>
+                  </a:outerShdw>
+                </a:effectLst>
+              </a14:hiddenEffects>
+            </a:ext>
+          </a:extLst>
+        </p:spPr>
+        <p:txBody>
+          <a:bodyPr vert="horz" wrap="square" lIns="91440" tIns="0" rIns="91440" bIns="63480" numCol="1" anchor="ctr" anchorCtr="0" compatLnSpc="1">
+            <a:prstTxWarp prst="textNoShape">
+              <a:avLst/>
+            </a:prstTxWarp>
+            <a:spAutoFit/>
+          </a:bodyPr>
+          <a:lstStyle>
+            <a:lvl1pPr eaLnBrk="0" fontAlgn="base" hangingPunct="0">
+              <a:spcBef>
+                <a:spcPct val="0"/>
+              </a:spcBef>
+              <a:spcAft>
+                <a:spcPct val="0"/>
+              </a:spcAft>
+              <a:defRPr>
+                <a:solidFill>
+                  <a:schemeClr val="tx1"/>
+                </a:solidFill>
+                <a:latin typeface="Arial" panose="020B0604020202020204" pitchFamily="34" charset="0"/>
+              </a:defRPr>
+            </a:lvl1pPr>
+            <a:lvl2pPr eaLnBrk="0" fontAlgn="base" hangingPunct="0">
+              <a:spcBef>
+                <a:spcPct val="0"/>
+              </a:spcBef>
+              <a:spcAft>
+                <a:spcPct val="0"/>
+              </a:spcAft>
+              <a:defRPr>
+                <a:solidFill>
+                  <a:schemeClr val="tx1"/>
+                </a:solidFill>
+                <a:latin typeface="Arial" panose="020B0604020202020204" pitchFamily="34" charset="0"/>
+              </a:defRPr>
+            </a:lvl2pPr>
+            <a:lvl3pPr eaLnBrk="0" fontAlgn="base" hangingPunct="0">
+              <a:spcBef>
+                <a:spcPct val="0"/>
+              </a:spcBef>
+              <a:spcAft>
+                <a:spcPct val="0"/>
+              </a:spcAft>
+              <a:defRPr>
+                <a:solidFill>
+                  <a:schemeClr val="tx1"/>
+                </a:solidFill>
+                <a:latin typeface="Arial" panose="020B0604020202020204" pitchFamily="34" charset="0"/>
+              </a:defRPr>
+            </a:lvl3pPr>
+            <a:lvl4pPr eaLnBrk="0" fontAlgn="base" hangingPunct="0">
+              <a:spcBef>
+                <a:spcPct val="0"/>
+              </a:spcBef>
+              <a:spcAft>
+                <a:spcPct val="0"/>
+              </a:spcAft>
+              <a:defRPr>
+                <a:solidFill>
+                  <a:schemeClr val="tx1"/>
+                </a:solidFill>
+                <a:latin typeface="Arial" panose="020B0604020202020204" pitchFamily="34" charset="0"/>
+              </a:defRPr>
+            </a:lvl4pPr>
+            <a:lvl5pPr eaLnBrk="0" fontAlgn="base" hangingPunct="0">
+              <a:spcBef>
+                <a:spcPct val="0"/>
+              </a:spcBef>
+              <a:spcAft>
+                <a:spcPct val="0"/>
+              </a:spcAft>
+              <a:defRPr>
+                <a:solidFill>
+                  <a:schemeClr val="tx1"/>
+                </a:solidFill>
+                <a:latin typeface="Arial" panose="020B0604020202020204" pitchFamily="34" charset="0"/>
+              </a:defRPr>
+            </a:lvl5pPr>
+            <a:lvl6pPr eaLnBrk="0" fontAlgn="base" hangingPunct="0">
+              <a:spcBef>
+                <a:spcPct val="0"/>
+              </a:spcBef>
+              <a:spcAft>
+                <a:spcPct val="0"/>
+              </a:spcAft>
+              <a:defRPr>
+                <a:solidFill>
+                  <a:schemeClr val="tx1"/>
+                </a:solidFill>
+                <a:latin typeface="Arial" panose="020B0604020202020204" pitchFamily="34" charset="0"/>
+              </a:defRPr>
+            </a:lvl6pPr>
+            <a:lvl7pPr eaLnBrk="0" fontAlgn="base" hangingPunct="0">
+              <a:spcBef>
+                <a:spcPct val="0"/>
+              </a:spcBef>
+              <a:spcAft>
+                <a:spcPct val="0"/>
+              </a:spcAft>
+              <a:defRPr>
+                <a:solidFill>
+                  <a:schemeClr val="tx1"/>
+                </a:solidFill>
+                <a:latin typeface="Arial" panose="020B0604020202020204" pitchFamily="34" charset="0"/>
+              </a:defRPr>
+            </a:lvl7pPr>
+            <a:lvl8pPr eaLnBrk="0" fontAlgn="base" hangingPunct="0">
+              <a:spcBef>
+                <a:spcPct val="0"/>
+              </a:spcBef>
+              <a:spcAft>
+                <a:spcPct val="0"/>
+              </a:spcAft>
+              <a:defRPr>
+                <a:solidFill>
+                  <a:schemeClr val="tx1"/>
+                </a:solidFill>
+                <a:latin typeface="Arial" panose="020B0604020202020204" pitchFamily="34" charset="0"/>
+              </a:defRPr>
+            </a:lvl8pPr>
+            <a:lvl9pPr eaLnBrk="0" fontAlgn="base" hangingPunct="0">
+              <a:spcBef>
+                <a:spcPct val="0"/>
+              </a:spcBef>
+              <a:spcAft>
+                <a:spcPct val="0"/>
+              </a:spcAft>
+              <a:defRPr>
+                <a:solidFill>
+                  <a:schemeClr val="tx1"/>
+                </a:solidFill>
+                <a:latin typeface="Arial" panose="020B0604020202020204" pitchFamily="34" charset="0"/>
+              </a:defRPr>
+            </a:lvl9pPr>
+          </a:lstStyle>
+          <a:p>
+            <a:pPr marL="0" marR="0" lvl="0" indent="0" eaLnBrk="1" fontAlgn="base" hangingPunct="1">
+              <a:lnSpc>
+                <a:spcPct val="100000"/>
+              </a:lnSpc>
+              <a:spcBef>
+                <a:spcPct val="0"/>
+              </a:spcBef>
+              <a:spcAft>
+                <a:spcPct val="0"/>
+              </a:spcAft>
+              <a:buClrTx/>
+              <a:buSzTx/>
+              <a:buFontTx/>
+              <a:buNone/>
+              <a:tabLst/>
+            </a:pPr>
+            <a:r>
+              <a:rPr lang="es-MX" altLang="es-MX" sz="1200" dirty="0">
+                <a:solidFill>
+                  <a:srgbClr val="333333"/>
+                </a:solidFill>
+                <a:latin typeface="Helvetica Neue"/>
+              </a:rPr>
+              <a:t>Se observa que:</a:t>
+            </a:r>
+            <a:br>
+              <a:rPr lang="es-MX" altLang="es-MX" sz="1200" dirty="0">
+                <a:solidFill>
+                  <a:srgbClr val="333333"/>
+                </a:solidFill>
+                <a:latin typeface="Helvetica Neue"/>
+              </a:rPr>
+            </a:br>
+            <a:r>
+              <a:rPr lang="es-MX" altLang="es-MX" sz="1200" dirty="0">
+                <a:solidFill>
+                  <a:srgbClr val="333333"/>
+                </a:solidFill>
+                <a:latin typeface="Helvetica Neue"/>
+              </a:rPr>
+              <a:t>Los residuos del modelo MCG2 son más cercanos a cero que los del MCG1</a:t>
+            </a:r>
+          </a:p>
+          <a:p>
+            <a:pPr eaLnBrk="1" hangingPunct="1"/>
+            <a:r>
+              <a:rPr lang="es-MX" altLang="es-MX" sz="1200" dirty="0">
+                <a:solidFill>
+                  <a:srgbClr val="333333"/>
+                </a:solidFill>
+                <a:latin typeface="Helvetica Neue"/>
+              </a:rPr>
+              <a:t>Los errores estándar de los coeficientes del modelo MCG2 son bastante más pequeños que los del MCG1 por lo que se puede decir que ayudó el hecho de incorporar la matriz de covarianza </a:t>
+            </a:r>
+          </a:p>
+        </p:txBody>
+      </p:sp>
+      <p:sp>
+        <p:nvSpPr>
+          <p:cNvPr id="5" name="TextBox 4">
+            <a:extLst>
+              <a:ext uri="{FF2B5EF4-FFF2-40B4-BE49-F238E27FC236}">
+                <a16:creationId xmlns:a16="http://schemas.microsoft.com/office/drawing/2014/main" id="{0761419E-5DBF-F462-3415-5ED39C57466C}"/>
+              </a:ext>
+            </a:extLst>
+          </p:cNvPr>
+          <p:cNvSpPr txBox="1"/>
+          <p:nvPr/>
+        </p:nvSpPr>
+        <p:spPr>
+          <a:xfrm>
+            <a:off x="4214219" y="5811629"/>
+            <a:ext cx="4925370" cy="338554"/>
+          </a:xfrm>
+          <a:prstGeom prst="rect">
+            <a:avLst/>
+          </a:prstGeom>
+          <a:noFill/>
+        </p:spPr>
+        <p:txBody>
+          <a:bodyPr wrap="square">
+            <a:spAutoFit/>
+          </a:bodyPr>
+          <a:lstStyle/>
+          <a:p>
+            <a:pPr algn="l"/>
+            <a:r>
+              <a:rPr lang="es-MX" sz="1600" i="0" dirty="0">
+                <a:solidFill>
+                  <a:srgbClr val="333333"/>
+                </a:solidFill>
+                <a:effectLst/>
+                <a:latin typeface="Helvetica Neue"/>
+              </a:rPr>
+              <a:t>Evaluación general de los error del modelo MCG2</a:t>
+            </a:r>
+          </a:p>
+        </p:txBody>
+      </p:sp>
+      <p:sp>
+        <p:nvSpPr>
+          <p:cNvPr id="6" name="TextBox 5">
+            <a:extLst>
+              <a:ext uri="{FF2B5EF4-FFF2-40B4-BE49-F238E27FC236}">
+                <a16:creationId xmlns:a16="http://schemas.microsoft.com/office/drawing/2014/main" id="{33C61AE2-BF59-960B-9740-FE512F4C57A6}"/>
+              </a:ext>
+            </a:extLst>
+          </p:cNvPr>
+          <p:cNvSpPr txBox="1"/>
+          <p:nvPr/>
+        </p:nvSpPr>
+        <p:spPr>
+          <a:xfrm>
+            <a:off x="201486" y="2326003"/>
+            <a:ext cx="11789028" cy="1200329"/>
+          </a:xfrm>
+          <a:prstGeom prst="rect">
+            <a:avLst/>
+          </a:prstGeom>
+          <a:noFill/>
+        </p:spPr>
+        <p:txBody>
+          <a:bodyPr wrap="square">
+            <a:spAutoFit/>
+          </a:bodyPr>
+          <a:lstStyle/>
+          <a:p>
+            <a:pPr algn="ctr"/>
+            <a:r>
+              <a:rPr lang="es-MX" b="1" i="0" u="none" strike="noStrike" dirty="0">
+                <a:solidFill>
+                  <a:srgbClr val="333333"/>
+                </a:solidFill>
+                <a:effectLst/>
+                <a:latin typeface="+mj-lt"/>
+                <a:cs typeface="Arial" panose="020B0604020202020204" pitchFamily="34" charset="0"/>
+              </a:rPr>
+              <a:t>log(</a:t>
+            </a:r>
+            <a:r>
+              <a:rPr lang="es-MX" b="1" i="0" u="none" strike="noStrike" dirty="0" err="1">
+                <a:solidFill>
+                  <a:srgbClr val="333333"/>
+                </a:solidFill>
+                <a:effectLst/>
+                <a:latin typeface="+mj-lt"/>
+                <a:cs typeface="Arial" panose="020B0604020202020204" pitchFamily="34" charset="0"/>
+              </a:rPr>
+              <a:t>wagei</a:t>
+            </a:r>
+            <a:r>
+              <a:rPr lang="es-MX" b="1" i="0" u="none" strike="noStrike" dirty="0">
+                <a:solidFill>
+                  <a:srgbClr val="333333"/>
+                </a:solidFill>
+                <a:effectLst/>
+                <a:latin typeface="+mj-lt"/>
+                <a:cs typeface="Arial" panose="020B0604020202020204" pitchFamily="34" charset="0"/>
+              </a:rPr>
+              <a:t>)=0.54+0.033∗educi+0.0025∗experi+0.0000003∗faminci−0.068∗femalei+0.045∗metroi−0.030∗</a:t>
+            </a:r>
+            <a:r>
+              <a:rPr lang="el-GR" b="1" i="0" u="none" strike="noStrike" dirty="0">
+                <a:solidFill>
+                  <a:srgbClr val="333333"/>
+                </a:solidFill>
+                <a:effectLst/>
+                <a:latin typeface="+mj-lt"/>
+                <a:cs typeface="Arial" panose="020B0604020202020204" pitchFamily="34" charset="0"/>
+              </a:rPr>
+              <a:t>θ1+0.043∗θ2+0.0021∗θ3−0.0037∗θ4−0.009∗θ5+ε</a:t>
+            </a:r>
+            <a:r>
+              <a:rPr lang="es-MX" b="1" i="0" u="none" strike="noStrike" dirty="0">
+                <a:solidFill>
+                  <a:srgbClr val="333333"/>
+                </a:solidFill>
+                <a:effectLst/>
+                <a:latin typeface="+mj-lt"/>
+                <a:cs typeface="Arial" panose="020B0604020202020204" pitchFamily="34" charset="0"/>
+              </a:rPr>
+              <a:t>i</a:t>
+            </a:r>
+            <a:br>
+              <a:rPr lang="es-MX" b="1" dirty="0">
+                <a:latin typeface="+mj-lt"/>
+                <a:cs typeface="Arial" panose="020B0604020202020204" pitchFamily="34" charset="0"/>
+              </a:rPr>
+            </a:br>
+            <a:br>
+              <a:rPr lang="es-MX" b="1" dirty="0">
+                <a:latin typeface="+mj-lt"/>
+                <a:cs typeface="Arial" panose="020B0604020202020204" pitchFamily="34" charset="0"/>
+              </a:rPr>
+            </a:br>
+            <a:endParaRPr lang="es-MX" b="1" dirty="0">
+              <a:latin typeface="+mj-lt"/>
+              <a:cs typeface="Arial" panose="020B0604020202020204" pitchFamily="34" charset="0"/>
+            </a:endParaRPr>
+          </a:p>
+        </p:txBody>
+      </p:sp>
+      <p:pic>
+        <p:nvPicPr>
+          <p:cNvPr id="8" name="Picture 7">
+            <a:extLst>
+              <a:ext uri="{FF2B5EF4-FFF2-40B4-BE49-F238E27FC236}">
+                <a16:creationId xmlns:a16="http://schemas.microsoft.com/office/drawing/2014/main" id="{455C82EE-B7D7-EB96-8182-2641E00BD712}"/>
+              </a:ext>
+            </a:extLst>
+          </p:cNvPr>
+          <p:cNvPicPr>
+            <a:picLocks noChangeAspect="1"/>
+          </p:cNvPicPr>
+          <p:nvPr/>
+        </p:nvPicPr>
+        <p:blipFill rotWithShape="1">
+          <a:blip r:embed="rId3"/>
+          <a:srcRect t="832"/>
+          <a:stretch/>
+        </p:blipFill>
+        <p:spPr>
+          <a:xfrm>
+            <a:off x="670560" y="2684923"/>
+            <a:ext cx="2946640" cy="3438309"/>
+          </a:xfrm>
+          <a:prstGeom prst="rect">
+            <a:avLst/>
+          </a:prstGeom>
+        </p:spPr>
+      </p:pic>
+      <p:pic>
+        <p:nvPicPr>
+          <p:cNvPr id="2050" name="Picture 2">
+            <a:extLst>
+              <a:ext uri="{FF2B5EF4-FFF2-40B4-BE49-F238E27FC236}">
+                <a16:creationId xmlns:a16="http://schemas.microsoft.com/office/drawing/2014/main" id="{407C9580-E5CD-2F18-AFEA-5EAF78BE456D}"/>
+              </a:ext>
+            </a:extLst>
+          </p:cNvPr>
+          <p:cNvPicPr>
+            <a:picLocks noChangeAspect="1" noChangeArrowheads="1"/>
+          </p:cNvPicPr>
+          <p:nvPr/>
+        </p:nvPicPr>
+        <p:blipFill>
+          <a:blip r:embed="rId4">
+            <a:extLst>
+              <a:ext uri="{28A0092B-C50C-407E-A947-70E740481C1C}">
+                <a14:useLocalDpi xmlns:a14="http://schemas.microsoft.com/office/drawing/2010/main" val="0"/>
+              </a:ext>
+            </a:extLst>
+          </a:blip>
+          <a:srcRect/>
+          <a:stretch>
+            <a:fillRect/>
+          </a:stretch>
+        </p:blipFill>
+        <p:spPr bwMode="auto">
+          <a:xfrm>
+            <a:off x="4510370" y="3001732"/>
+            <a:ext cx="4071846" cy="2908460"/>
+          </a:xfrm>
+          <a:prstGeom prst="rect">
+            <a:avLst/>
+          </a:prstGeom>
+          <a:noFill/>
+          <a:extLst>
+            <a:ext uri="{909E8E84-426E-40DD-AFC4-6F175D3DCCD1}">
+              <a14:hiddenFill xmlns:a14="http://schemas.microsoft.com/office/drawing/2010/main">
+                <a:solidFill>
+                  <a:srgbClr val="FFFFFF"/>
+                </a:solidFill>
+              </a14:hiddenFill>
+            </a:ext>
+          </a:extLst>
+        </p:spPr>
+      </p:pic>
+    </p:spTree>
+    <p:extLst>
+      <p:ext uri="{BB962C8B-B14F-4D97-AF65-F5344CB8AC3E}">
+        <p14:creationId xmlns:p14="http://schemas.microsoft.com/office/powerpoint/2010/main" val="1777633693"/>
+      </p:ext>
+    </p:extLst>
+  </p:cSld>
+  <p:clrMapOvr>
+    <a:masterClrMapping/>
+  </p:clrMapOvr>
+</p:sld>
+</file>
+
+<file path=ppt/slides/slide18.xml><?xml version="1.0" encoding="utf-8"?>
+<p:sld xmlns:a="http://schemas.openxmlformats.org/drawingml/2006/main" xmlns:r="http://schemas.openxmlformats.org/officeDocument/2006/relationships" xmlns:p="http://schemas.openxmlformats.org/presentationml/2006/main">
+  <p:cSld>
+    <p:spTree>
+      <p:nvGrpSpPr>
+        <p:cNvPr id="1" name=""/>
+        <p:cNvGrpSpPr/>
+        <p:nvPr/>
+      </p:nvGrpSpPr>
+      <p:grpSpPr>
+        <a:xfrm>
+          <a:off x="0" y="0"/>
+          <a:ext cx="0" cy="0"/>
+          <a:chOff x="0" y="0"/>
+          <a:chExt cx="0" cy="0"/>
+        </a:xfrm>
+      </p:grpSpPr>
+      <p:sp>
+        <p:nvSpPr>
+          <p:cNvPr id="4" name="Title 2">
+            <a:extLst>
+              <a:ext uri="{FF2B5EF4-FFF2-40B4-BE49-F238E27FC236}">
+                <a16:creationId xmlns:a16="http://schemas.microsoft.com/office/drawing/2014/main" id="{D46A2E87-6FFB-3D1F-1681-9C49DDC7D4FF}"/>
+              </a:ext>
+            </a:extLst>
+          </p:cNvPr>
+          <p:cNvSpPr txBox="1">
+            <a:spLocks/>
+          </p:cNvSpPr>
+          <p:nvPr/>
+        </p:nvSpPr>
+        <p:spPr>
+          <a:xfrm>
+            <a:off x="510558" y="196996"/>
             <a:ext cx="10228562" cy="594360"/>
           </a:xfrm>
           <a:prstGeom prst="rect">
@@ -9803,14 +12623,14 @@
           <p:nvPr>
             <p:extLst>
               <p:ext uri="{D42A27DB-BD31-4B8C-83A1-F6EECF244321}">
-                <p14:modId xmlns:p14="http://schemas.microsoft.com/office/powerpoint/2010/main" val="2218788355"/>
+                <p14:modId xmlns:p14="http://schemas.microsoft.com/office/powerpoint/2010/main" val="3936019730"/>
               </p:ext>
             </p:extLst>
           </p:nvPr>
         </p:nvGraphicFramePr>
         <p:xfrm>
           <a:off x="510558" y="799676"/>
-          <a:ext cx="11010882" cy="4160520"/>
+          <a:ext cx="11010882" cy="5521960"/>
         </p:xfrm>
         <a:graphic>
           <a:graphicData uri="http://schemas.openxmlformats.org/drawingml/2006/table">
@@ -11461,6 +14281,13 @@
                     <a:bodyPr/>
                     <a:lstStyle/>
                     <a:p>
+                      <a:r>
+                        <a:rPr lang="es-ES" sz="1400" dirty="0">
+                          <a:latin typeface="Arial" panose="020B0604020202020204" pitchFamily="34" charset="0"/>
+                          <a:cs typeface="Arial" panose="020B0604020202020204" pitchFamily="34" charset="0"/>
+                        </a:rPr>
+                        <a:t>MCG1</a:t>
+                      </a:r>
                       <a:endParaRPr lang="es-MX" sz="1400" dirty="0">
                         <a:latin typeface="Arial" panose="020B0604020202020204" pitchFamily="34" charset="0"/>
                         <a:cs typeface="Arial" panose="020B0604020202020204" pitchFamily="34" charset="0"/>
@@ -11516,6 +14343,13 @@
                     <a:bodyPr/>
                     <a:lstStyle/>
                     <a:p>
+                      <a:r>
+                        <a:rPr lang="es-ES" sz="1400" dirty="0">
+                          <a:latin typeface="Arial" panose="020B0604020202020204" pitchFamily="34" charset="0"/>
+                          <a:cs typeface="Arial" panose="020B0604020202020204" pitchFamily="34" charset="0"/>
+                        </a:rPr>
+                        <a:t>GLS</a:t>
+                      </a:r>
                       <a:endParaRPr lang="es-MX" sz="1400" dirty="0">
                         <a:latin typeface="Arial" panose="020B0604020202020204" pitchFamily="34" charset="0"/>
                         <a:cs typeface="Arial" panose="020B0604020202020204" pitchFamily="34" charset="0"/>
@@ -11588,6 +14422,328 @@
                         <a:tabLst/>
                         <a:defRPr/>
                       </a:pPr>
+                      <a:r>
+                        <a:rPr lang="es-MX" sz="1400" b="0" i="0" u="none" strike="noStrike" dirty="0">
+                          <a:solidFill>
+                            <a:srgbClr val="333333"/>
+                          </a:solidFill>
+                          <a:effectLst/>
+                          <a:latin typeface="MathJax_Math-italic"/>
+                        </a:rPr>
+                        <a:t>log</a:t>
+                      </a:r>
+                      <a:r>
+                        <a:rPr lang="es-MX" sz="1400" b="0" i="0" u="none" strike="noStrike" dirty="0">
+                          <a:solidFill>
+                            <a:srgbClr val="333333"/>
+                          </a:solidFill>
+                          <a:effectLst/>
+                          <a:latin typeface="MathJax_Main"/>
+                        </a:rPr>
+                        <a:t>(</a:t>
+                      </a:r>
+                      <a:r>
+                        <a:rPr lang="es-MX" sz="1400" b="0" i="0" u="none" strike="noStrike" dirty="0" err="1">
+                          <a:solidFill>
+                            <a:srgbClr val="333333"/>
+                          </a:solidFill>
+                          <a:effectLst/>
+                          <a:latin typeface="MathJax_Math-italic"/>
+                        </a:rPr>
+                        <a:t>wagei</a:t>
+                      </a:r>
+                      <a:r>
+                        <a:rPr lang="es-MX" sz="1400" b="0" i="0" u="none" strike="noStrike" dirty="0">
+                          <a:solidFill>
+                            <a:srgbClr val="333333"/>
+                          </a:solidFill>
+                          <a:effectLst/>
+                          <a:latin typeface="MathJax_Main"/>
+                        </a:rPr>
+                        <a:t>)=1.24+0.11∗</a:t>
+                      </a:r>
+                      <a:r>
+                        <a:rPr lang="es-MX" sz="1400" b="0" i="0" u="none" strike="noStrike" dirty="0">
+                          <a:solidFill>
+                            <a:srgbClr val="333333"/>
+                          </a:solidFill>
+                          <a:effectLst/>
+                          <a:latin typeface="MathJax_Math-italic"/>
+                        </a:rPr>
+                        <a:t>educi</a:t>
+                      </a:r>
+                      <a:r>
+                        <a:rPr lang="es-MX" sz="1400" b="0" i="0" u="none" strike="noStrike" dirty="0">
+                          <a:solidFill>
+                            <a:srgbClr val="333333"/>
+                          </a:solidFill>
+                          <a:effectLst/>
+                          <a:latin typeface="MathJax_Main"/>
+                        </a:rPr>
+                        <a:t>+0.008∗</a:t>
+                      </a:r>
+                      <a:r>
+                        <a:rPr lang="es-MX" sz="1400" b="0" i="0" u="none" strike="noStrike" dirty="0">
+                          <a:solidFill>
+                            <a:srgbClr val="333333"/>
+                          </a:solidFill>
+                          <a:effectLst/>
+                          <a:latin typeface="MathJax_Math-italic"/>
+                        </a:rPr>
+                        <a:t>experi</a:t>
+                      </a:r>
+                      <a:r>
+                        <a:rPr lang="es-MX" sz="1400" b="0" i="0" u="none" strike="noStrike" dirty="0">
+                          <a:solidFill>
+                            <a:srgbClr val="333333"/>
+                          </a:solidFill>
+                          <a:effectLst/>
+                          <a:latin typeface="MathJax_Main"/>
+                        </a:rPr>
+                        <a:t>+0.000001∗</a:t>
+                      </a:r>
+                      <a:r>
+                        <a:rPr lang="es-MX" sz="1400" b="0" i="0" u="none" strike="noStrike" dirty="0">
+                          <a:solidFill>
+                            <a:srgbClr val="333333"/>
+                          </a:solidFill>
+                          <a:effectLst/>
+                          <a:latin typeface="MathJax_Math-italic"/>
+                        </a:rPr>
+                        <a:t>faminci</a:t>
+                      </a:r>
+                      <a:r>
+                        <a:rPr lang="es-MX" sz="1400" b="0" i="0" u="none" strike="noStrike" dirty="0">
+                          <a:solidFill>
+                            <a:srgbClr val="333333"/>
+                          </a:solidFill>
+                          <a:effectLst/>
+                          <a:latin typeface="MathJax_Main"/>
+                        </a:rPr>
+                        <a:t>−0.22∗</a:t>
+                      </a:r>
+                      <a:r>
+                        <a:rPr lang="es-MX" sz="1400" b="0" i="0" u="none" strike="noStrike" dirty="0">
+                          <a:solidFill>
+                            <a:srgbClr val="333333"/>
+                          </a:solidFill>
+                          <a:effectLst/>
+                          <a:latin typeface="MathJax_Math-italic"/>
+                        </a:rPr>
+                        <a:t>femalei</a:t>
+                      </a:r>
+                      <a:r>
+                        <a:rPr lang="es-MX" sz="1400" b="0" i="0" u="none" strike="noStrike" dirty="0">
+                          <a:solidFill>
+                            <a:srgbClr val="333333"/>
+                          </a:solidFill>
+                          <a:effectLst/>
+                          <a:latin typeface="MathJax_Main"/>
+                        </a:rPr>
+                        <a:t>+0.14∗</a:t>
+                      </a:r>
+                      <a:r>
+                        <a:rPr lang="es-MX" sz="1400" b="0" i="0" u="none" strike="noStrike" dirty="0">
+                          <a:solidFill>
+                            <a:srgbClr val="333333"/>
+                          </a:solidFill>
+                          <a:effectLst/>
+                          <a:latin typeface="MathJax_Math-italic"/>
+                        </a:rPr>
+                        <a:t>metroi</a:t>
+                      </a:r>
+                      <a:r>
+                        <a:rPr lang="es-MX" sz="1400" b="0" i="0" u="none" strike="noStrike" dirty="0">
+                          <a:solidFill>
+                            <a:srgbClr val="333333"/>
+                          </a:solidFill>
+                          <a:effectLst/>
+                          <a:latin typeface="MathJax_Main"/>
+                        </a:rPr>
+                        <a:t>−0.052∗</a:t>
+                      </a:r>
+                      <a:r>
+                        <a:rPr lang="el-GR" sz="1400" b="0" i="0" u="none" strike="noStrike" dirty="0">
+                          <a:solidFill>
+                            <a:srgbClr val="333333"/>
+                          </a:solidFill>
+                          <a:effectLst/>
+                          <a:latin typeface="MathJax_Math-italic"/>
+                        </a:rPr>
+                        <a:t>θ</a:t>
+                      </a:r>
+                      <a:r>
+                        <a:rPr lang="el-GR" sz="1400" b="0" i="0" u="none" strike="noStrike" dirty="0">
+                          <a:solidFill>
+                            <a:srgbClr val="333333"/>
+                          </a:solidFill>
+                          <a:effectLst/>
+                          <a:latin typeface="MathJax_Main"/>
+                        </a:rPr>
+                        <a:t>1+0.045∗</a:t>
+                      </a:r>
+                      <a:r>
+                        <a:rPr lang="el-GR" sz="1400" b="0" i="0" u="none" strike="noStrike" dirty="0">
+                          <a:solidFill>
+                            <a:srgbClr val="333333"/>
+                          </a:solidFill>
+                          <a:effectLst/>
+                          <a:latin typeface="MathJax_Math-italic"/>
+                        </a:rPr>
+                        <a:t>θ</a:t>
+                      </a:r>
+                      <a:r>
+                        <a:rPr lang="el-GR" sz="1400" b="0" i="0" u="none" strike="noStrike" dirty="0">
+                          <a:solidFill>
+                            <a:srgbClr val="333333"/>
+                          </a:solidFill>
+                          <a:effectLst/>
+                          <a:latin typeface="MathJax_Main"/>
+                        </a:rPr>
+                        <a:t>2+0.032∗</a:t>
+                      </a:r>
+                      <a:r>
+                        <a:rPr lang="el-GR" sz="1400" b="0" i="0" u="none" strike="noStrike" dirty="0">
+                          <a:solidFill>
+                            <a:srgbClr val="333333"/>
+                          </a:solidFill>
+                          <a:effectLst/>
+                          <a:latin typeface="MathJax_Math-italic"/>
+                        </a:rPr>
+                        <a:t>θ</a:t>
+                      </a:r>
+                      <a:r>
+                        <a:rPr lang="el-GR" sz="1400" b="0" i="0" u="none" strike="noStrike" dirty="0">
+                          <a:solidFill>
+                            <a:srgbClr val="333333"/>
+                          </a:solidFill>
+                          <a:effectLst/>
+                          <a:latin typeface="MathJax_Main"/>
+                        </a:rPr>
+                        <a:t>3−0.063∗</a:t>
+                      </a:r>
+                      <a:r>
+                        <a:rPr lang="el-GR" sz="1400" b="0" i="0" u="none" strike="noStrike" dirty="0">
+                          <a:solidFill>
+                            <a:srgbClr val="333333"/>
+                          </a:solidFill>
+                          <a:effectLst/>
+                          <a:latin typeface="MathJax_Math-italic"/>
+                        </a:rPr>
+                        <a:t>θ</a:t>
+                      </a:r>
+                      <a:r>
+                        <a:rPr lang="el-GR" sz="1400" b="0" i="0" u="none" strike="noStrike" dirty="0">
+                          <a:solidFill>
+                            <a:srgbClr val="333333"/>
+                          </a:solidFill>
+                          <a:effectLst/>
+                          <a:latin typeface="MathJax_Main"/>
+                        </a:rPr>
+                        <a:t>4−0.068∗</a:t>
+                      </a:r>
+                      <a:r>
+                        <a:rPr lang="el-GR" sz="1400" b="0" i="0" u="none" strike="noStrike" dirty="0">
+                          <a:solidFill>
+                            <a:srgbClr val="333333"/>
+                          </a:solidFill>
+                          <a:effectLst/>
+                          <a:latin typeface="MathJax_Math-italic"/>
+                        </a:rPr>
+                        <a:t>θ</a:t>
+                      </a:r>
+                      <a:r>
+                        <a:rPr lang="el-GR" sz="1400" b="0" i="0" u="none" strike="noStrike" dirty="0">
+                          <a:solidFill>
+                            <a:srgbClr val="333333"/>
+                          </a:solidFill>
+                          <a:effectLst/>
+                          <a:latin typeface="MathJax_Main"/>
+                        </a:rPr>
+                        <a:t>5+</a:t>
+                      </a:r>
+                      <a:r>
+                        <a:rPr lang="el-GR" sz="1400" b="0" i="0" u="none" strike="noStrike" dirty="0">
+                          <a:solidFill>
+                            <a:srgbClr val="333333"/>
+                          </a:solidFill>
+                          <a:effectLst/>
+                          <a:latin typeface="MathJax_Math-italic"/>
+                        </a:rPr>
+                        <a:t>ε</a:t>
+                      </a:r>
+                      <a:r>
+                        <a:rPr lang="es-MX" sz="1400" b="0" i="0" u="none" strike="noStrike" dirty="0">
+                          <a:solidFill>
+                            <a:srgbClr val="333333"/>
+                          </a:solidFill>
+                          <a:effectLst/>
+                          <a:latin typeface="MathJax_Math-italic"/>
+                        </a:rPr>
+                        <a:t>i</a:t>
+                      </a:r>
+                      <a:endParaRPr lang="es-MX" sz="1400" b="0" dirty="0">
+                        <a:latin typeface="Arial" panose="020B0604020202020204" pitchFamily="34" charset="0"/>
+                        <a:cs typeface="Arial" panose="020B0604020202020204" pitchFamily="34" charset="0"/>
+                      </a:endParaRPr>
+                    </a:p>
+                  </a:txBody>
+                  <a:tcPr>
+                    <a:lnL w="12700" cap="flat" cmpd="sng" algn="ctr">
+                      <a:solidFill>
+                        <a:schemeClr val="tx1"/>
+                      </a:solidFill>
+                      <a:prstDash val="solid"/>
+                      <a:round/>
+                      <a:headEnd type="none" w="med" len="med"/>
+                      <a:tailEnd type="none" w="med" len="med"/>
+                    </a:lnL>
+                    <a:lnR w="12700" cap="flat" cmpd="sng" algn="ctr">
+                      <a:solidFill>
+                        <a:schemeClr val="tx1"/>
+                      </a:solidFill>
+                      <a:prstDash val="solid"/>
+                      <a:round/>
+                      <a:headEnd type="none" w="med" len="med"/>
+                      <a:tailEnd type="none" w="med" len="med"/>
+                    </a:lnR>
+                    <a:lnT w="12700" cap="flat" cmpd="sng" algn="ctr">
+                      <a:solidFill>
+                        <a:schemeClr val="tx1"/>
+                      </a:solidFill>
+                      <a:prstDash val="solid"/>
+                      <a:round/>
+                      <a:headEnd type="none" w="med" len="med"/>
+                      <a:tailEnd type="none" w="med" len="med"/>
+                    </a:lnT>
+                    <a:lnB w="12700" cap="flat" cmpd="sng" algn="ctr">
+                      <a:solidFill>
+                        <a:schemeClr val="tx1"/>
+                      </a:solidFill>
+                      <a:prstDash val="solid"/>
+                      <a:round/>
+                      <a:headEnd type="none" w="med" len="med"/>
+                      <a:tailEnd type="none" w="med" len="med"/>
+                    </a:lnB>
+                    <a:solidFill>
+                      <a:schemeClr val="bg1">
+                        <a:lumMod val="95000"/>
+                      </a:schemeClr>
+                    </a:solidFill>
+                  </a:tcPr>
+                </a:tc>
+                <a:tc>
+                  <a:txBody>
+                    <a:bodyPr/>
+                    <a:lstStyle/>
+                    <a:p>
+                      <a:r>
+                        <a:rPr lang="es-ES" sz="1400" dirty="0">
+                          <a:latin typeface="Arial" panose="020B0604020202020204" pitchFamily="34" charset="0"/>
+                          <a:cs typeface="Arial" panose="020B0604020202020204" pitchFamily="34" charset="0"/>
+                        </a:rPr>
+                        <a:t>0.47</a:t>
+                      </a:r>
                       <a:endParaRPr lang="es-MX" sz="1400" dirty="0">
                         <a:latin typeface="Arial" panose="020B0604020202020204" pitchFamily="34" charset="0"/>
                         <a:cs typeface="Arial" panose="020B0604020202020204" pitchFamily="34" charset="0"/>
@@ -11643,60 +14799,53 @@
                     <a:bodyPr/>
                     <a:lstStyle/>
                     <a:p>
-                      <a:endParaRPr lang="es-MX" sz="1400" dirty="0">
-                        <a:latin typeface="Arial" panose="020B0604020202020204" pitchFamily="34" charset="0"/>
-                        <a:cs typeface="Arial" panose="020B0604020202020204" pitchFamily="34" charset="0"/>
-                      </a:endParaRPr>
+                      <a:r>
+                        <a:rPr lang="en-US" sz="1400" dirty="0">
+                          <a:latin typeface="Arial" panose="020B0604020202020204" pitchFamily="34" charset="0"/>
+                          <a:cs typeface="Arial" panose="020B0604020202020204" pitchFamily="34" charset="0"/>
+                        </a:rPr>
+                        <a:t>Las variables black, Midwest </a:t>
+                      </a:r>
+                      <a:r>
+                        <a:rPr lang="es-ES" sz="1400" dirty="0">
+                          <a:latin typeface="Arial" panose="020B0604020202020204" pitchFamily="34" charset="0"/>
+                          <a:cs typeface="Arial" panose="020B0604020202020204" pitchFamily="34" charset="0"/>
+                        </a:rPr>
+                        <a:t>&amp; </a:t>
+                      </a:r>
+                      <a:r>
+                        <a:rPr lang="es-ES" sz="1400" dirty="0" err="1">
+                          <a:latin typeface="Arial" panose="020B0604020202020204" pitchFamily="34" charset="0"/>
+                          <a:cs typeface="Arial" panose="020B0604020202020204" pitchFamily="34" charset="0"/>
+                        </a:rPr>
+                        <a:t>south</a:t>
+                      </a:r>
+                      <a:r>
+                        <a:rPr lang="es-ES" sz="1400" dirty="0">
+                          <a:latin typeface="Arial" panose="020B0604020202020204" pitchFamily="34" charset="0"/>
+                          <a:cs typeface="Arial" panose="020B0604020202020204" pitchFamily="34" charset="0"/>
+                        </a:rPr>
+                        <a:t> no son significativas </a:t>
+                      </a:r>
                     </a:p>
-                  </a:txBody>
-                  <a:tcPr>
-                    <a:lnL w="12700" cap="flat" cmpd="sng" algn="ctr">
-                      <a:solidFill>
-                        <a:schemeClr val="tx1"/>
-                      </a:solidFill>
-                      <a:prstDash val="solid"/>
-                      <a:round/>
-                      <a:headEnd type="none" w="med" len="med"/>
-                      <a:tailEnd type="none" w="med" len="med"/>
-                    </a:lnL>
-                    <a:lnR w="12700" cap="flat" cmpd="sng" algn="ctr">
-                      <a:solidFill>
-                        <a:schemeClr val="tx1"/>
-                      </a:solidFill>
-                      <a:prstDash val="solid"/>
-                      <a:round/>
-                      <a:headEnd type="none" w="med" len="med"/>
-                      <a:tailEnd type="none" w="med" len="med"/>
-                    </a:lnR>
-                    <a:lnT w="12700" cap="flat" cmpd="sng" algn="ctr">
-                      <a:solidFill>
-                        <a:schemeClr val="tx1"/>
-                      </a:solidFill>
-                      <a:prstDash val="solid"/>
-                      <a:round/>
-                      <a:headEnd type="none" w="med" len="med"/>
-                      <a:tailEnd type="none" w="med" len="med"/>
-                    </a:lnT>
-                    <a:lnB w="12700" cap="flat" cmpd="sng" algn="ctr">
-                      <a:solidFill>
-                        <a:schemeClr val="tx1"/>
-                      </a:solidFill>
-                      <a:prstDash val="solid"/>
-                      <a:round/>
-                      <a:headEnd type="none" w="med" len="med"/>
-                      <a:tailEnd type="none" w="med" len="med"/>
-                    </a:lnB>
-                    <a:solidFill>
-                      <a:schemeClr val="bg1">
-                        <a:lumMod val="95000"/>
-                      </a:schemeClr>
-                    </a:solidFill>
-                  </a:tcPr>
-                </a:tc>
-                <a:tc>
-                  <a:txBody>
-                    <a:bodyPr/>
-                    <a:lstStyle/>
+                    <a:p>
+                      <a:r>
+                        <a:rPr lang="es-ES" sz="1400" dirty="0">
+                          <a:latin typeface="Arial" panose="020B0604020202020204" pitchFamily="34" charset="0"/>
+                          <a:cs typeface="Arial" panose="020B0604020202020204" pitchFamily="34" charset="0"/>
+                        </a:rPr>
+                        <a:t>+ Heterocedasticidad de errores</a:t>
+                      </a:r>
+                    </a:p>
+                    <a:p>
+                      <a:r>
+                        <a:rPr lang="es-ES" sz="1400" dirty="0">
+                          <a:latin typeface="Arial" panose="020B0604020202020204" pitchFamily="34" charset="0"/>
+                          <a:cs typeface="Arial" panose="020B0604020202020204" pitchFamily="34" charset="0"/>
+                        </a:rPr>
+                        <a:t>+ Normalidad de los errores</a:t>
+                      </a:r>
+                    </a:p>
                     <a:p>
                       <a:endParaRPr lang="es-ES" sz="1400" dirty="0">
                         <a:latin typeface="Arial" panose="020B0604020202020204" pitchFamily="34" charset="0"/>
@@ -11752,6 +14901,36 @@
                   <a:txBody>
                     <a:bodyPr/>
                     <a:lstStyle/>
+                    <a:p>
+                      <a:pPr marL="0" marR="0" lvl="0" indent="0" algn="l" defTabSz="914400" rtl="0" eaLnBrk="1" fontAlgn="auto" latinLnBrk="0" hangingPunct="1">
+                        <a:lnSpc>
+                          <a:spcPct val="100000"/>
+                        </a:lnSpc>
+                        <a:spcBef>
+                          <a:spcPts val="0"/>
+                        </a:spcBef>
+                        <a:spcAft>
+                          <a:spcPts val="0"/>
+                        </a:spcAft>
+                        <a:buClrTx/>
+                        <a:buSzTx/>
+                        <a:buFontTx/>
+                        <a:buNone/>
+                        <a:tabLst/>
+                        <a:defRPr/>
+                      </a:pPr>
+                      <a:r>
+                        <a:rPr lang="es-ES" sz="1400" dirty="0">
+                          <a:latin typeface="Arial" panose="020B0604020202020204" pitchFamily="34" charset="0"/>
+                          <a:cs typeface="Arial" panose="020B0604020202020204" pitchFamily="34" charset="0"/>
+                        </a:rPr>
+                        <a:t>25.6%</a:t>
+                      </a:r>
+                      <a:endParaRPr lang="es-MX" sz="1400" dirty="0">
+                        <a:latin typeface="Arial" panose="020B0604020202020204" pitchFamily="34" charset="0"/>
+                        <a:cs typeface="Arial" panose="020B0604020202020204" pitchFamily="34" charset="0"/>
+                      </a:endParaRPr>
+                    </a:p>
                     <a:p>
                       <a:endParaRPr lang="es-MX" sz="1400" dirty="0">
                         <a:latin typeface="Arial" panose="020B0604020202020204" pitchFamily="34" charset="0"/>
@@ -11815,6 +14994,13 @@
                     <a:bodyPr/>
                     <a:lstStyle/>
                     <a:p>
+                      <a:r>
+                        <a:rPr lang="es-ES" sz="1400" dirty="0">
+                          <a:latin typeface="Arial" panose="020B0604020202020204" pitchFamily="34" charset="0"/>
+                          <a:cs typeface="Arial" panose="020B0604020202020204" pitchFamily="34" charset="0"/>
+                        </a:rPr>
+                        <a:t>MCG2</a:t>
+                      </a:r>
                       <a:endParaRPr lang="es-MX" sz="1400" dirty="0">
                         <a:latin typeface="Arial" panose="020B0604020202020204" pitchFamily="34" charset="0"/>
                         <a:cs typeface="Arial" panose="020B0604020202020204" pitchFamily="34" charset="0"/>
@@ -11870,6 +15056,13 @@
                     <a:bodyPr/>
                     <a:lstStyle/>
                     <a:p>
+                      <a:r>
+                        <a:rPr lang="es-ES" sz="1400" dirty="0">
+                          <a:latin typeface="Arial" panose="020B0604020202020204" pitchFamily="34" charset="0"/>
+                          <a:cs typeface="Arial" panose="020B0604020202020204" pitchFamily="34" charset="0"/>
+                        </a:rPr>
+                        <a:t>GLS</a:t>
+                      </a:r>
                       <a:endParaRPr lang="es-MX" sz="1400" dirty="0">
                         <a:latin typeface="Arial" panose="020B0604020202020204" pitchFamily="34" charset="0"/>
                         <a:cs typeface="Arial" panose="020B0604020202020204" pitchFamily="34" charset="0"/>
@@ -11942,6 +15135,128 @@
                         <a:tabLst/>
                         <a:defRPr/>
                       </a:pPr>
+                      <a:r>
+                        <a:rPr lang="es-MX" sz="1400" b="0" i="0" u="none" strike="noStrike" kern="1200" dirty="0">
+                          <a:solidFill>
+                            <a:srgbClr val="333333"/>
+                          </a:solidFill>
+                          <a:effectLst/>
+                          <a:latin typeface="+mn-lt"/>
+                          <a:ea typeface="+mn-ea"/>
+                          <a:cs typeface="Arial" panose="020B0604020202020204" pitchFamily="34" charset="0"/>
+                        </a:rPr>
+                        <a:t>log(</a:t>
+                      </a:r>
+                      <a:r>
+                        <a:rPr lang="es-MX" sz="1400" b="0" i="0" u="none" strike="noStrike" kern="1200" dirty="0" err="1">
+                          <a:solidFill>
+                            <a:srgbClr val="333333"/>
+                          </a:solidFill>
+                          <a:effectLst/>
+                          <a:latin typeface="+mn-lt"/>
+                          <a:ea typeface="+mn-ea"/>
+                          <a:cs typeface="Arial" panose="020B0604020202020204" pitchFamily="34" charset="0"/>
+                        </a:rPr>
+                        <a:t>wagei</a:t>
+                      </a:r>
+                      <a:r>
+                        <a:rPr lang="es-MX" sz="1400" b="0" i="0" u="none" strike="noStrike" kern="1200" dirty="0">
+                          <a:solidFill>
+                            <a:srgbClr val="333333"/>
+                          </a:solidFill>
+                          <a:effectLst/>
+                          <a:latin typeface="+mn-lt"/>
+                          <a:ea typeface="+mn-ea"/>
+                          <a:cs typeface="Arial" panose="020B0604020202020204" pitchFamily="34" charset="0"/>
+                        </a:rPr>
+                        <a:t>)=0.54+0.033∗educi+0.0025∗experi+0.0000003∗faminci−0.068∗femalei+0.045∗metroi−0.030∗</a:t>
+                      </a:r>
+                      <a:r>
+                        <a:rPr lang="el-GR" sz="1400" b="0" i="0" u="none" strike="noStrike" kern="1200" dirty="0">
+                          <a:solidFill>
+                            <a:srgbClr val="333333"/>
+                          </a:solidFill>
+                          <a:effectLst/>
+                          <a:latin typeface="+mn-lt"/>
+                          <a:ea typeface="+mn-ea"/>
+                          <a:cs typeface="Arial" panose="020B0604020202020204" pitchFamily="34" charset="0"/>
+                        </a:rPr>
+                        <a:t>θ1+0.043∗θ2+0.0021∗θ3−0.0037∗θ4−0.009∗θ5+ε</a:t>
+                      </a:r>
+                      <a:r>
+                        <a:rPr lang="es-MX" sz="1400" b="0" i="0" u="none" strike="noStrike" kern="1200" dirty="0">
+                          <a:solidFill>
+                            <a:srgbClr val="333333"/>
+                          </a:solidFill>
+                          <a:effectLst/>
+                          <a:latin typeface="+mn-lt"/>
+                          <a:ea typeface="+mn-ea"/>
+                          <a:cs typeface="Arial" panose="020B0604020202020204" pitchFamily="34" charset="0"/>
+                        </a:rPr>
+                        <a:t>i</a:t>
+                      </a:r>
+                      <a:endParaRPr lang="es-MX" sz="1400" b="0" dirty="0">
+                        <a:latin typeface="Arial" panose="020B0604020202020204" pitchFamily="34" charset="0"/>
+                        <a:cs typeface="Arial" panose="020B0604020202020204" pitchFamily="34" charset="0"/>
+                      </a:endParaRPr>
+                    </a:p>
+                  </a:txBody>
+                  <a:tcPr>
+                    <a:lnL w="12700" cap="flat" cmpd="sng" algn="ctr">
+                      <a:solidFill>
+                        <a:schemeClr val="tx1"/>
+                      </a:solidFill>
+                      <a:prstDash val="solid"/>
+                      <a:round/>
+                      <a:headEnd type="none" w="med" len="med"/>
+                      <a:tailEnd type="none" w="med" len="med"/>
+                    </a:lnL>
+                    <a:lnR w="12700" cap="flat" cmpd="sng" algn="ctr">
+                      <a:solidFill>
+                        <a:schemeClr val="tx1"/>
+                      </a:solidFill>
+                      <a:prstDash val="solid"/>
+                      <a:round/>
+                      <a:headEnd type="none" w="med" len="med"/>
+                      <a:tailEnd type="none" w="med" len="med"/>
+                    </a:lnR>
+                    <a:lnT w="12700" cap="flat" cmpd="sng" algn="ctr">
+                      <a:solidFill>
+                        <a:schemeClr val="tx1"/>
+                      </a:solidFill>
+                      <a:prstDash val="solid"/>
+                      <a:round/>
+                      <a:headEnd type="none" w="med" len="med"/>
+                      <a:tailEnd type="none" w="med" len="med"/>
+                    </a:lnT>
+                    <a:lnB w="12700" cap="flat" cmpd="sng" algn="ctr">
+                      <a:solidFill>
+                        <a:schemeClr val="tx1"/>
+                      </a:solidFill>
+                      <a:prstDash val="solid"/>
+                      <a:round/>
+                      <a:headEnd type="none" w="med" len="med"/>
+                      <a:tailEnd type="none" w="med" len="med"/>
+                    </a:lnB>
+                    <a:solidFill>
+                      <a:schemeClr val="bg1">
+                        <a:lumMod val="95000"/>
+                      </a:schemeClr>
+                    </a:solidFill>
+                  </a:tcPr>
+                </a:tc>
+                <a:tc>
+                  <a:txBody>
+                    <a:bodyPr/>
+                    <a:lstStyle/>
+                    <a:p>
+                      <a:r>
+                        <a:rPr lang="es-ES" sz="1400" dirty="0">
+                          <a:latin typeface="Arial" panose="020B0604020202020204" pitchFamily="34" charset="0"/>
+                          <a:cs typeface="Arial" panose="020B0604020202020204" pitchFamily="34" charset="0"/>
+                        </a:rPr>
+                        <a:t>0.55</a:t>
+                      </a:r>
                       <a:endParaRPr lang="es-MX" sz="1400" dirty="0">
                         <a:latin typeface="Arial" panose="020B0604020202020204" pitchFamily="34" charset="0"/>
                         <a:cs typeface="Arial" panose="020B0604020202020204" pitchFamily="34" charset="0"/>
@@ -11997,10 +15312,52 @@
                     <a:bodyPr/>
                     <a:lstStyle/>
                     <a:p>
-                      <a:endParaRPr lang="es-MX" sz="1400" dirty="0">
-                        <a:latin typeface="Arial" panose="020B0604020202020204" pitchFamily="34" charset="0"/>
-                        <a:cs typeface="Arial" panose="020B0604020202020204" pitchFamily="34" charset="0"/>
-                      </a:endParaRPr>
+                      <a:r>
+                        <a:rPr lang="en-US" sz="1400" dirty="0">
+                          <a:latin typeface="Arial" panose="020B0604020202020204" pitchFamily="34" charset="0"/>
+                          <a:cs typeface="Arial" panose="020B0604020202020204" pitchFamily="34" charset="0"/>
+                        </a:rPr>
+                        <a:t>Las variables black, Midwest </a:t>
+                      </a:r>
+                      <a:r>
+                        <a:rPr lang="es-ES" sz="1400" dirty="0">
+                          <a:latin typeface="Arial" panose="020B0604020202020204" pitchFamily="34" charset="0"/>
+                          <a:cs typeface="Arial" panose="020B0604020202020204" pitchFamily="34" charset="0"/>
+                        </a:rPr>
+                        <a:t>&amp; </a:t>
+                      </a:r>
+                      <a:r>
+                        <a:rPr lang="es-ES" sz="1400" dirty="0" err="1">
+                          <a:latin typeface="Arial" panose="020B0604020202020204" pitchFamily="34" charset="0"/>
+                          <a:cs typeface="Arial" panose="020B0604020202020204" pitchFamily="34" charset="0"/>
+                        </a:rPr>
+                        <a:t>south</a:t>
+                      </a:r>
+                      <a:r>
+                        <a:rPr lang="es-ES" sz="1400" dirty="0">
+                          <a:latin typeface="Arial" panose="020B0604020202020204" pitchFamily="34" charset="0"/>
+                          <a:cs typeface="Arial" panose="020B0604020202020204" pitchFamily="34" charset="0"/>
+                        </a:rPr>
+                        <a:t> no son significativas </a:t>
+                      </a:r>
+                    </a:p>
+                    <a:p>
+                      <a:r>
+                        <a:rPr lang="es-ES" sz="1400" dirty="0">
+                          <a:latin typeface="Arial" panose="020B0604020202020204" pitchFamily="34" charset="0"/>
+                          <a:cs typeface="Arial" panose="020B0604020202020204" pitchFamily="34" charset="0"/>
+                        </a:rPr>
+                        <a:t>+ Homocedasticidad de errores</a:t>
+                      </a:r>
+                    </a:p>
+                    <a:p>
+                      <a:r>
+                        <a:rPr lang="es-ES" sz="1400" dirty="0">
+                          <a:latin typeface="Arial" panose="020B0604020202020204" pitchFamily="34" charset="0"/>
+                          <a:cs typeface="Arial" panose="020B0604020202020204" pitchFamily="34" charset="0"/>
+                        </a:rPr>
+                        <a:t>+ Normalidad de los errores</a:t>
+                      </a:r>
                     </a:p>
                   </a:txBody>
                   <a:tcPr>
@@ -12052,61 +15409,30 @@
                     <a:bodyPr/>
                     <a:lstStyle/>
                     <a:p>
-                      <a:endParaRPr lang="es-ES" sz="1400" dirty="0">
-                        <a:latin typeface="Arial" panose="020B0604020202020204" pitchFamily="34" charset="0"/>
-                        <a:cs typeface="Arial" panose="020B0604020202020204" pitchFamily="34" charset="0"/>
-                      </a:endParaRPr>
-                    </a:p>
-                  </a:txBody>
-                  <a:tcPr>
-                    <a:lnL w="12700" cap="flat" cmpd="sng" algn="ctr">
-                      <a:solidFill>
-                        <a:schemeClr val="tx1"/>
-                      </a:solidFill>
-                      <a:prstDash val="solid"/>
-                      <a:round/>
-                      <a:headEnd type="none" w="med" len="med"/>
-                      <a:tailEnd type="none" w="med" len="med"/>
-                    </a:lnL>
-                    <a:lnR w="12700" cap="flat" cmpd="sng" algn="ctr">
-                      <a:solidFill>
-                        <a:schemeClr val="tx1"/>
-                      </a:solidFill>
-                      <a:prstDash val="solid"/>
-                      <a:round/>
-                      <a:headEnd type="none" w="med" len="med"/>
-                      <a:tailEnd type="none" w="med" len="med"/>
-                    </a:lnR>
-                    <a:lnT w="12700" cap="flat" cmpd="sng" algn="ctr">
-                      <a:solidFill>
-                        <a:schemeClr val="tx1"/>
-                      </a:solidFill>
-                      <a:prstDash val="solid"/>
-                      <a:round/>
-                      <a:headEnd type="none" w="med" len="med"/>
-                      <a:tailEnd type="none" w="med" len="med"/>
-                    </a:lnT>
-                    <a:lnB w="12700" cap="flat" cmpd="sng" algn="ctr">
-                      <a:solidFill>
-                        <a:schemeClr val="tx1"/>
-                      </a:solidFill>
-                      <a:prstDash val="solid"/>
-                      <a:round/>
-                      <a:headEnd type="none" w="med" len="med"/>
-                      <a:tailEnd type="none" w="med" len="med"/>
-                    </a:lnB>
-                    <a:solidFill>
-                      <a:schemeClr val="bg1">
-                        <a:lumMod val="95000"/>
-                      </a:schemeClr>
-                    </a:solidFill>
-                  </a:tcPr>
-                </a:tc>
-                <a:tc>
-                  <a:txBody>
-                    <a:bodyPr/>
-                    <a:lstStyle/>
-                    <a:p>
+                      <a:pPr marL="0" marR="0" lvl="0" indent="0" algn="l" defTabSz="914400" rtl="0" eaLnBrk="1" fontAlgn="auto" latinLnBrk="0" hangingPunct="1">
+                        <a:lnSpc>
+                          <a:spcPct val="100000"/>
+                        </a:lnSpc>
+                        <a:spcBef>
+                          <a:spcPts val="0"/>
+                        </a:spcBef>
+                        <a:spcAft>
+                          <a:spcPts val="0"/>
+                        </a:spcAft>
+                        <a:buClrTx/>
+                        <a:buSzTx/>
+                        <a:buFontTx/>
+                        <a:buNone/>
+                        <a:tabLst/>
+                        <a:defRPr/>
+                      </a:pPr>
+                      <a:r>
+                        <a:rPr lang="es-ES" sz="1400" dirty="0">
+                          <a:latin typeface="Arial" panose="020B0604020202020204" pitchFamily="34" charset="0"/>
+                          <a:cs typeface="Arial" panose="020B0604020202020204" pitchFamily="34" charset="0"/>
+                        </a:rPr>
+                        <a:t>22.3%</a:t>
+                      </a:r>
                       <a:endParaRPr lang="es-MX" sz="1400" dirty="0">
                         <a:latin typeface="Arial" panose="020B0604020202020204" pitchFamily="34" charset="0"/>
                         <a:cs typeface="Arial" panose="020B0604020202020204" pitchFamily="34" charset="0"/>
@@ -16269,47 +19595,67 @@
                 <a:effectLst/>
                 <a:latin typeface="Helvetica Neue"/>
               </a:rPr>
-              <a:t>Los coeficientes son los esperados para las variables “</a:t>
-            </a:r>
-            <a:r>
-              <a:rPr lang="es-MX" sz="1200" b="0" i="0" dirty="0" err="1">
+              <a:t>Los coeficientes son los esperados para las variables </a:t>
+            </a:r>
+            <a:r>
+              <a:rPr lang="es-MX" sz="1200" b="0" i="0" u="sng" dirty="0">
                 <a:solidFill>
                   <a:srgbClr val="333333"/>
                 </a:solidFill>
                 <a:effectLst/>
                 <a:latin typeface="Helvetica Neue"/>
               </a:rPr>
-              <a:t>educ</a:t>
-            </a:r>
-            <a:r>
-              <a:rPr lang="es-MX" sz="1200" b="0" i="0" dirty="0">
+              <a:t>“</a:t>
+            </a:r>
+            <a:r>
+              <a:rPr lang="es-MX" sz="1200" b="0" i="0" u="sng" dirty="0" err="1">
                 <a:solidFill>
                   <a:srgbClr val="333333"/>
                 </a:solidFill>
                 <a:effectLst/>
                 <a:latin typeface="Helvetica Neue"/>
               </a:rPr>
-              <a:t>”, “</a:t>
-            </a:r>
-            <a:r>
-              <a:rPr lang="es-MX" sz="1200" b="0" i="0" dirty="0" err="1">
+              <a:t>educ</a:t>
+            </a:r>
+            <a:r>
+              <a:rPr lang="es-MX" sz="1200" b="0" i="0" u="sng" dirty="0">
                 <a:solidFill>
                   <a:srgbClr val="333333"/>
                 </a:solidFill>
                 <a:effectLst/>
                 <a:latin typeface="Helvetica Neue"/>
               </a:rPr>
-              <a:t>exper</a:t>
-            </a:r>
-            <a:r>
-              <a:rPr lang="es-MX" sz="1200" b="0" i="0" dirty="0">
+              <a:t>”, “</a:t>
+            </a:r>
+            <a:r>
+              <a:rPr lang="es-MX" sz="1200" b="0" i="0" u="sng" dirty="0" err="1">
                 <a:solidFill>
                   <a:srgbClr val="333333"/>
                 </a:solidFill>
                 <a:effectLst/>
                 <a:latin typeface="Helvetica Neue"/>
               </a:rPr>
-              <a:t>”: - Un año más de educación representa en promedio 2.54 más de ganancia - Un año más de experiencia representa en promedio 0.19 más de ganancia</a:t>
+              <a:t>exper</a:t>
+            </a:r>
+            <a:r>
+              <a:rPr lang="es-MX" sz="1200" b="0" i="0" u="sng" dirty="0">
+                <a:solidFill>
+                  <a:srgbClr val="333333"/>
+                </a:solidFill>
+                <a:effectLst/>
+                <a:latin typeface="Helvetica Neue"/>
+              </a:rPr>
+              <a:t>”:</a:t>
+            </a:r>
+            <a:r>
+              <a:rPr lang="es-MX" sz="1200" b="0" i="0" dirty="0">
+                <a:solidFill>
+                  <a:srgbClr val="333333"/>
+                </a:solidFill>
+                <a:effectLst/>
+                <a:latin typeface="Helvetica Neue"/>
+              </a:rPr>
+              <a:t> - Un año más de educación representa en promedio 2.54 más de ganancia - Un año más de experiencia representa en promedio 0.19 más de ganancia</a:t>
             </a:r>
           </a:p>
           <a:p>
@@ -16325,7 +19671,27 @@
                 <a:effectLst/>
                 <a:latin typeface="Helvetica Neue"/>
               </a:rPr>
-              <a:t>El coeficiente de la variable “metro” también es el esperado: - Vivir en un área metropolitana representa en promedio 3.48 más de ganancia con respecto a no vivir en un área metropolitana</a:t>
+              <a:t>El coeficiente de la variable </a:t>
+            </a:r>
+            <a:r>
+              <a:rPr lang="es-MX" sz="1200" b="0" i="0" u="sng" dirty="0">
+                <a:solidFill>
+                  <a:srgbClr val="333333"/>
+                </a:solidFill>
+                <a:effectLst/>
+                <a:latin typeface="Helvetica Neue"/>
+              </a:rPr>
+              <a:t>“metro”</a:t>
+            </a:r>
+            <a:r>
+              <a:rPr lang="es-MX" sz="1200" b="0" i="0" dirty="0">
+                <a:solidFill>
+                  <a:srgbClr val="333333"/>
+                </a:solidFill>
+                <a:effectLst/>
+                <a:latin typeface="Helvetica Neue"/>
+              </a:rPr>
+              <a:t> también es el esperado: - Vivir en un área metropolitana representa en promedio 3.48 más de ganancia con respecto a no vivir en un área metropolitana</a:t>
             </a:r>
           </a:p>
           <a:p>
@@ -16341,47 +19707,67 @@
                 <a:effectLst/>
                 <a:latin typeface="Helvetica Neue"/>
               </a:rPr>
-              <a:t>Para los coeficientes regionales de las variables “</a:t>
-            </a:r>
-            <a:r>
-              <a:rPr lang="es-MX" sz="1200" b="0" i="0" dirty="0" err="1">
+              <a:t>Para los coeficientes regionales de las variables </a:t>
+            </a:r>
+            <a:r>
+              <a:rPr lang="es-MX" sz="1200" b="0" i="0" u="sng" dirty="0">
                 <a:solidFill>
                   <a:srgbClr val="333333"/>
                 </a:solidFill>
                 <a:effectLst/>
                 <a:latin typeface="Helvetica Neue"/>
               </a:rPr>
-              <a:t>west</a:t>
-            </a:r>
-            <a:r>
-              <a:rPr lang="es-MX" sz="1200" b="0" i="0" dirty="0">
+              <a:t>“</a:t>
+            </a:r>
+            <a:r>
+              <a:rPr lang="es-MX" sz="1200" b="0" i="0" u="sng" dirty="0" err="1">
                 <a:solidFill>
                   <a:srgbClr val="333333"/>
                 </a:solidFill>
                 <a:effectLst/>
                 <a:latin typeface="Helvetica Neue"/>
               </a:rPr>
-              <a:t>” y “</a:t>
-            </a:r>
-            <a:r>
-              <a:rPr lang="es-MX" sz="1200" b="0" i="0" dirty="0" err="1">
+              <a:t>west</a:t>
+            </a:r>
+            <a:r>
+              <a:rPr lang="es-MX" sz="1200" b="0" i="0" u="sng" dirty="0">
                 <a:solidFill>
                   <a:srgbClr val="333333"/>
                 </a:solidFill>
                 <a:effectLst/>
                 <a:latin typeface="Helvetica Neue"/>
               </a:rPr>
-              <a:t>midwest</a:t>
-            </a:r>
-            <a:r>
-              <a:rPr lang="es-MX" sz="1200" b="0" i="0" dirty="0">
+              <a:t>” y “</a:t>
+            </a:r>
+            <a:r>
+              <a:rPr lang="es-MX" sz="1200" b="0" i="0" u="sng" dirty="0" err="1">
                 <a:solidFill>
                   <a:srgbClr val="333333"/>
                 </a:solidFill>
                 <a:effectLst/>
                 <a:latin typeface="Helvetica Neue"/>
               </a:rPr>
-              <a:t>”, dado que solo una de ellas es significativa o “linealmente independiente”, el programa tomó solo una de ellas en la ecuación lineal del modelo MCO. - Vivir en un área “</a:t>
+              <a:t>midwest</a:t>
+            </a:r>
+            <a:r>
+              <a:rPr lang="es-MX" sz="1200" b="0" i="0" u="sng" dirty="0">
+                <a:solidFill>
+                  <a:srgbClr val="333333"/>
+                </a:solidFill>
+                <a:effectLst/>
+                <a:latin typeface="Helvetica Neue"/>
+              </a:rPr>
+              <a:t>”, </a:t>
+            </a:r>
+            <a:r>
+              <a:rPr lang="es-MX" sz="1200" b="0" i="0" dirty="0">
+                <a:solidFill>
+                  <a:srgbClr val="333333"/>
+                </a:solidFill>
+                <a:effectLst/>
+                <a:latin typeface="Helvetica Neue"/>
+              </a:rPr>
+              <a:t>dado que solo una de ellas es significativa o “linealmente independiente”, el programa tomó solo una de ellas en la ecuación lineal del modelo MCO. - Vivir en un área “</a:t>
             </a:r>
             <a:r>
               <a:rPr lang="es-MX" sz="1200" b="0" i="0" dirty="0" err="1">
@@ -16477,27 +19863,47 @@
                 <a:effectLst/>
                 <a:latin typeface="Helvetica Neue"/>
               </a:rPr>
-              <a:t>Para los coeficientes regionales de la variable “</a:t>
-            </a:r>
-            <a:r>
-              <a:rPr lang="es-MX" sz="1200" b="0" i="0" dirty="0" err="1">
+              <a:t>Para los coeficientes regionales de la variable </a:t>
+            </a:r>
+            <a:r>
+              <a:rPr lang="es-MX" sz="1200" b="0" i="0" u="sng" dirty="0">
                 <a:solidFill>
                   <a:srgbClr val="333333"/>
                 </a:solidFill>
                 <a:effectLst/>
                 <a:latin typeface="Helvetica Neue"/>
               </a:rPr>
-              <a:t>south</a:t>
-            </a:r>
-            <a:r>
-              <a:rPr lang="es-MX" sz="1200" b="0" i="0" dirty="0">
+              <a:t>“</a:t>
+            </a:r>
+            <a:r>
+              <a:rPr lang="es-MX" sz="1200" b="0" i="0" u="sng" dirty="0" err="1">
                 <a:solidFill>
                   <a:srgbClr val="333333"/>
                 </a:solidFill>
                 <a:effectLst/>
                 <a:latin typeface="Helvetica Neue"/>
               </a:rPr>
-              <a:t>” - Vivir en un área “</a:t>
+              <a:t>south</a:t>
+            </a:r>
+            <a:r>
+              <a:rPr lang="es-MX" sz="1200" b="0" i="0" u="sng" dirty="0">
+                <a:solidFill>
+                  <a:srgbClr val="333333"/>
+                </a:solidFill>
+                <a:effectLst/>
+                <a:latin typeface="Helvetica Neue"/>
+              </a:rPr>
+              <a:t>” </a:t>
+            </a:r>
+            <a:r>
+              <a:rPr lang="es-MX" sz="1200" b="0" i="0" dirty="0">
+                <a:solidFill>
+                  <a:srgbClr val="333333"/>
+                </a:solidFill>
+                <a:effectLst/>
+                <a:latin typeface="Helvetica Neue"/>
+              </a:rPr>
+              <a:t>- Vivir en un área “</a:t>
             </a:r>
             <a:r>
               <a:rPr lang="es-MX" sz="1200" b="0" i="0" dirty="0" err="1">
@@ -16553,27 +19959,47 @@
                 <a:effectLst/>
                 <a:latin typeface="Helvetica Neue"/>
               </a:rPr>
-              <a:t>El signo del coeficiente de la variable “</a:t>
-            </a:r>
-            <a:r>
-              <a:rPr lang="es-MX" sz="1200" b="0" i="0" dirty="0" err="1">
+              <a:t>El signo del coeficiente de la variable </a:t>
+            </a:r>
+            <a:r>
+              <a:rPr lang="es-MX" sz="1200" b="0" i="0" u="sng" dirty="0">
                 <a:solidFill>
                   <a:srgbClr val="333333"/>
                 </a:solidFill>
                 <a:effectLst/>
                 <a:latin typeface="Helvetica Neue"/>
               </a:rPr>
-              <a:t>female</a:t>
-            </a:r>
-            <a:r>
-              <a:rPr lang="es-MX" sz="1200" b="0" i="0" dirty="0">
+              <a:t>“</a:t>
+            </a:r>
+            <a:r>
+              <a:rPr lang="es-MX" sz="1200" b="0" i="0" u="sng" dirty="0" err="1">
                 <a:solidFill>
                   <a:srgbClr val="333333"/>
                 </a:solidFill>
                 <a:effectLst/>
                 <a:latin typeface="Helvetica Neue"/>
               </a:rPr>
-              <a:t>” es negativo y significativo, lo que indica una posible discriminación en la fuerza laboral (cabe recalcar que este es solo el modelo inicial, por lo que aún no podemos estar seguros). - Ser “</a:t>
+              <a:t>female</a:t>
+            </a:r>
+            <a:r>
+              <a:rPr lang="es-MX" sz="1200" b="0" i="0" u="sng" dirty="0">
+                <a:solidFill>
+                  <a:srgbClr val="333333"/>
+                </a:solidFill>
+                <a:effectLst/>
+                <a:latin typeface="Helvetica Neue"/>
+              </a:rPr>
+              <a:t>” </a:t>
+            </a:r>
+            <a:r>
+              <a:rPr lang="es-MX" sz="1200" b="0" i="0" dirty="0">
+                <a:solidFill>
+                  <a:srgbClr val="333333"/>
+                </a:solidFill>
+                <a:effectLst/>
+                <a:latin typeface="Helvetica Neue"/>
+              </a:rPr>
+              <a:t>es negativo y significativo, lo que indica una posible discriminación en la fuerza laboral (cabe recalcar que este es solo el modelo inicial, por lo que aún no podemos estar seguros). - Ser “</a:t>
             </a:r>
             <a:r>
               <a:rPr lang="es-MX" sz="1200" b="0" i="0" dirty="0" err="1">
@@ -16629,27 +20055,47 @@
                 <a:effectLst/>
                 <a:latin typeface="Helvetica Neue"/>
               </a:rPr>
-              <a:t>El signo del coeficiente de la variable “</a:t>
-            </a:r>
-            <a:r>
-              <a:rPr lang="es-MX" sz="1200" b="0" i="0" dirty="0" err="1">
+              <a:t>El signo del coeficiente de la variable </a:t>
+            </a:r>
+            <a:r>
+              <a:rPr lang="es-MX" sz="1200" b="0" i="0" u="sng" dirty="0">
                 <a:solidFill>
                   <a:srgbClr val="333333"/>
                 </a:solidFill>
                 <a:effectLst/>
                 <a:latin typeface="Helvetica Neue"/>
               </a:rPr>
-              <a:t>black</a:t>
-            </a:r>
-            <a:r>
-              <a:rPr lang="es-MX" sz="1200" b="0" i="0" dirty="0">
+              <a:t>“</a:t>
+            </a:r>
+            <a:r>
+              <a:rPr lang="es-MX" sz="1200" b="0" i="0" u="sng" dirty="0" err="1">
                 <a:solidFill>
                   <a:srgbClr val="333333"/>
                 </a:solidFill>
                 <a:effectLst/>
                 <a:latin typeface="Helvetica Neue"/>
               </a:rPr>
-              <a:t>” es negativo, pero no tan grande como </a:t>
+              <a:t>black</a:t>
+            </a:r>
+            <a:r>
+              <a:rPr lang="es-MX" sz="1200" b="0" i="0" u="sng" dirty="0">
+                <a:solidFill>
+                  <a:srgbClr val="333333"/>
+                </a:solidFill>
+                <a:effectLst/>
+                <a:latin typeface="Helvetica Neue"/>
+              </a:rPr>
+              <a:t>” </a:t>
+            </a:r>
+            <a:r>
+              <a:rPr lang="es-MX" sz="1200" b="0" i="0" dirty="0">
+                <a:solidFill>
+                  <a:srgbClr val="333333"/>
+                </a:solidFill>
+                <a:effectLst/>
+                <a:latin typeface="Helvetica Neue"/>
+              </a:rPr>
+              <a:t>es negativo, pero no tan grande como </a:t>
             </a:r>
             <a:r>
               <a:rPr lang="es-MX" sz="1200" b="0" i="0" dirty="0" err="1">
@@ -17831,7 +21277,7 @@
         </p:nvSpPr>
         <p:spPr>
           <a:xfrm>
-            <a:off x="510558" y="778745"/>
+            <a:off x="510558" y="764090"/>
             <a:ext cx="10802620" cy="485598"/>
           </a:xfrm>
           <a:prstGeom prst="rect">
@@ -17859,25 +21305,25 @@
           <a:p>
             <a:pPr algn="ctr"/>
             <a:r>
-              <a:rPr lang="es-MX" dirty="0" err="1"/>
+              <a:rPr lang="es-MX" b="1" dirty="0" err="1"/>
               <a:t>wagei</a:t>
             </a:r>
             <a:r>
-              <a:rPr lang="es-MX" dirty="0"/>
+              <a:rPr lang="es-MX" b="1" dirty="0"/>
               <a:t>=−19.27+2.55∗educi+0.19∗experi+0.00005∗faminci−5.90∗femalei+3.68∗metroi+</a:t>
             </a:r>
             <a:r>
-              <a:rPr lang="el-GR" dirty="0"/>
+              <a:rPr lang="el-GR" b="1" dirty="0"/>
               <a:t>ε</a:t>
             </a:r>
             <a:r>
-              <a:rPr lang="es-MX" dirty="0"/>
+              <a:rPr lang="es-MX" b="1" dirty="0"/>
               <a:t>i</a:t>
             </a:r>
             <a:br>
-              <a:rPr lang="es-MX" dirty="0"/>
+              <a:rPr lang="es-MX" b="1" dirty="0"/>
             </a:br>
-            <a:endParaRPr lang="es-MX" dirty="0"/>
+            <a:endParaRPr lang="es-MX" b="1" dirty="0"/>
           </a:p>
         </p:txBody>
       </p:sp>
@@ -17903,8 +21349,8 @@
         </p:blipFill>
         <p:spPr>
           <a:xfrm>
-            <a:off x="381919" y="1445654"/>
-            <a:ext cx="6241384" cy="4792829"/>
+            <a:off x="391299" y="1789240"/>
+            <a:ext cx="5673985" cy="4357117"/>
           </a:xfrm>
           <a:prstGeom prst="rect">
             <a:avLst/>
@@ -17972,7 +21418,7 @@
         </p:nvSpPr>
         <p:spPr>
           <a:xfrm>
-            <a:off x="6117217" y="1295130"/>
+            <a:off x="6289407" y="1321245"/>
             <a:ext cx="5827133" cy="369332"/>
           </a:xfrm>
           <a:prstGeom prst="rect">
@@ -17995,8 +21441,57 @@
                 <a:effectLst/>
                 <a:latin typeface="Helvetica Neue"/>
               </a:rPr>
-              <a:t>Evaluación de los error del modelo MCO2</a:t>
-            </a:r>
+              <a:t>Evaluación general de los error del modelo MCO2</a:t>
+            </a:r>
+          </a:p>
+        </p:txBody>
+      </p:sp>
+      <p:sp>
+        <p:nvSpPr>
+          <p:cNvPr id="2" name="TextBox 1">
+            <a:extLst>
+              <a:ext uri="{FF2B5EF4-FFF2-40B4-BE49-F238E27FC236}">
+                <a16:creationId xmlns:a16="http://schemas.microsoft.com/office/drawing/2014/main" id="{8B31B192-FC52-90FD-81A4-74479348636A}"/>
+              </a:ext>
+            </a:extLst>
+          </p:cNvPr>
+          <p:cNvSpPr txBox="1"/>
+          <p:nvPr/>
+        </p:nvSpPr>
+        <p:spPr>
+          <a:xfrm>
+            <a:off x="225691" y="1397847"/>
+            <a:ext cx="5655056" cy="369332"/>
+          </a:xfrm>
+          <a:prstGeom prst="rect">
+            <a:avLst/>
+          </a:prstGeom>
+          <a:noFill/>
+        </p:spPr>
+        <p:txBody>
+          <a:bodyPr wrap="square">
+            <a:spAutoFit/>
+          </a:bodyPr>
+          <a:lstStyle/>
+          <a:p>
+            <a:pPr algn="ctr"/>
+            <a:r>
+              <a:rPr lang="es-ES" sz="1800" dirty="0"/>
+              <a:t>Los supuestos de Gauss </a:t>
+            </a:r>
+            <a:r>
+              <a:rPr lang="es-ES" sz="1800" dirty="0" err="1"/>
+              <a:t>Markov</a:t>
+            </a:r>
+            <a:r>
+              <a:rPr lang="es-ES" sz="1800" dirty="0"/>
+              <a:t> </a:t>
+            </a:r>
+            <a:r>
+              <a:rPr lang="es-ES" dirty="0"/>
+              <a:t>sobre los modelos lineales </a:t>
+            </a:r>
+            <a:endParaRPr lang="es-MX" sz="1800" dirty="0"/>
           </a:p>
         </p:txBody>
       </p:sp>

</xml_diff>

<commit_message>
Examen a casa version del 28 Nov 2023
</commit_message>
<xml_diff>
--- a/Mod_Lineales_Examen_a_casa_v1_1.pptx
+++ b/Mod_Lineales_Examen_a_casa_v1_1.pptx
@@ -17393,7 +17393,7 @@
                 </a:solidFill>
                 <a:cs typeface="Arial" pitchFamily="34" charset="0"/>
               </a:rPr>
-              <a:t>El modelo MCG como corrección de posible no normalidad en los errores llevando a cabo transformación de </a:t>
+              <a:t>Corrección de posible no normalidad en los errores llevando a cabo transformación de </a:t>
             </a:r>
             <a:r>
               <a:rPr lang="es-MX" sz="1100" b="1" kern="0" dirty="0" err="1">
@@ -17902,14 +17902,6 @@
               <a:rPr lang="es-MX" sz="1400" dirty="0"/>
               <a:t> - = 1 si el encuestado se clasifica como raza negra </a:t>
             </a:r>
-            <a:r>
-              <a:rPr lang="es-MX" sz="1400" dirty="0" err="1"/>
-              <a:t>educ</a:t>
-            </a:r>
-            <a:r>
-              <a:rPr lang="es-MX" sz="1400" dirty="0"/>
-              <a:t> - años de educación </a:t>
-            </a:r>
           </a:p>
           <a:p>
             <a:pPr marL="285750" indent="-285750">
@@ -17918,12 +17910,32 @@
             </a:pPr>
             <a:r>
               <a:rPr lang="es-MX" sz="1400" dirty="0" err="1"/>
+              <a:t>educ</a:t>
+            </a:r>
+            <a:r>
+              <a:rPr lang="es-MX" sz="1400" dirty="0"/>
+              <a:t> - años de educación </a:t>
+            </a:r>
+          </a:p>
+          <a:p>
+            <a:pPr marL="285750" indent="-285750">
+              <a:buFont typeface="Arial" panose="020B0604020202020204" pitchFamily="34" charset="0"/>
+              <a:buChar char="•"/>
+            </a:pPr>
+            <a:r>
+              <a:rPr lang="es-MX" sz="1400" dirty="0" err="1"/>
               <a:t>exper</a:t>
             </a:r>
             <a:r>
               <a:rPr lang="es-MX" sz="1400" dirty="0"/>
-              <a:t> - experiencia potencial = edad - educación - 6 </a:t>
-            </a:r>
+              <a:t> - experiencia </a:t>
+            </a:r>
+          </a:p>
+          <a:p>
+            <a:pPr marL="285750" indent="-285750">
+              <a:buFont typeface="Arial" panose="020B0604020202020204" pitchFamily="34" charset="0"/>
+              <a:buChar char="•"/>
+            </a:pPr>
             <a:r>
               <a:rPr lang="es-MX" sz="1400" dirty="0" err="1"/>
               <a:t>faminc</a:t>

</xml_diff>